<commit_message>
os mid assembly mid datacom mid
</commit_message>
<xml_diff>
--- a/Data Communication/Lecture on Byte-Bit Stuffing.pptx
+++ b/Data Communication/Lecture on Byte-Bit Stuffing.pptx
@@ -1,30 +1,30 @@
 
 <file path=ppt/presentation.xml><?xml version="1.0" encoding="utf-8"?>
-<p:presentation xmlns:a="http://schemas.openxmlformats.org/drawingml/2006/main" xmlns:r="http://schemas.openxmlformats.org/officeDocument/2006/relationships" xmlns:p="http://schemas.openxmlformats.org/presentationml/2006/main" saveSubsetFonts="1">
+<p:presentation xmlns:a="http://schemas.openxmlformats.org/drawingml/2006/main" xmlns:r="http://schemas.openxmlformats.org/officeDocument/2006/relationships" xmlns:p="http://schemas.openxmlformats.org/presentationml/2006/main">
   <p:sldMasterIdLst>
     <p:sldMasterId id="2147483648" r:id="rId1"/>
   </p:sldMasterIdLst>
   <p:notesMasterIdLst>
-    <p:notesMasterId r:id="rId19"/>
+    <p:notesMasterId r:id="rId7"/>
   </p:notesMasterIdLst>
   <p:sldIdLst>
-    <p:sldId id="416" r:id="rId2"/>
-    <p:sldId id="419" r:id="rId3"/>
-    <p:sldId id="460" r:id="rId4"/>
-    <p:sldId id="461" r:id="rId5"/>
-    <p:sldId id="462" r:id="rId6"/>
-    <p:sldId id="463" r:id="rId7"/>
-    <p:sldId id="464" r:id="rId8"/>
-    <p:sldId id="467" r:id="rId9"/>
-    <p:sldId id="468" r:id="rId10"/>
-    <p:sldId id="465" r:id="rId11"/>
-    <p:sldId id="458" r:id="rId12"/>
-    <p:sldId id="471" r:id="rId13"/>
-    <p:sldId id="472" r:id="rId14"/>
-    <p:sldId id="470" r:id="rId15"/>
-    <p:sldId id="459" r:id="rId16"/>
-    <p:sldId id="415" r:id="rId17"/>
-    <p:sldId id="410" r:id="rId18"/>
+    <p:sldId id="416" r:id="rId3"/>
+    <p:sldId id="419" r:id="rId4"/>
+    <p:sldId id="460" r:id="rId5"/>
+    <p:sldId id="461" r:id="rId6"/>
+    <p:sldId id="462" r:id="rId8"/>
+    <p:sldId id="463" r:id="rId9"/>
+    <p:sldId id="464" r:id="rId10"/>
+    <p:sldId id="467" r:id="rId11"/>
+    <p:sldId id="468" r:id="rId12"/>
+    <p:sldId id="465" r:id="rId13"/>
+    <p:sldId id="458" r:id="rId14"/>
+    <p:sldId id="471" r:id="rId15"/>
+    <p:sldId id="472" r:id="rId16"/>
+    <p:sldId id="470" r:id="rId17"/>
+    <p:sldId id="459" r:id="rId18"/>
+    <p:sldId id="415" r:id="rId19"/>
+    <p:sldId id="410" r:id="rId20"/>
   </p:sldIdLst>
   <p:sldSz cx="9144000" cy="6858000" type="screen4x3"/>
   <p:notesSz cx="6858000" cy="9144000"/>
@@ -133,117 +133,39 @@
   <dgm:catLst>
     <dgm:cat type="accent1" pri="11200"/>
   </dgm:catLst>
-  <dgm:styleLbl name="node0">
+  <dgm:styleLbl name="alignAcc1">
     <dgm:fillClrLst meth="repeat">
-      <a:schemeClr val="accent1"/>
-    </dgm:fillClrLst>
-    <dgm:linClrLst meth="repeat">
-      <a:schemeClr val="lt1"/>
-    </dgm:linClrLst>
-    <dgm:effectClrLst/>
-    <dgm:txLinClrLst/>
-    <dgm:txFillClrLst/>
-    <dgm:txEffectClrLst/>
-  </dgm:styleLbl>
-  <dgm:styleLbl name="alignNode1">
-    <dgm:fillClrLst meth="repeat">
-      <a:schemeClr val="accent1"/>
+      <a:schemeClr val="lt1">
+        <a:alpha val="90000"/>
+      </a:schemeClr>
     </dgm:fillClrLst>
     <dgm:linClrLst meth="repeat">
       <a:schemeClr val="accent1"/>
     </dgm:linClrLst>
     <dgm:effectClrLst/>
     <dgm:txLinClrLst/>
-    <dgm:txFillClrLst/>
+    <dgm:txFillClrLst meth="repeat">
+      <a:schemeClr val="dk1"/>
+    </dgm:txFillClrLst>
     <dgm:txEffectClrLst/>
   </dgm:styleLbl>
-  <dgm:styleLbl name="node1">
-    <dgm:fillClrLst meth="repeat">
-      <a:schemeClr val="accent1"/>
-    </dgm:fillClrLst>
-    <dgm:linClrLst meth="repeat">
-      <a:schemeClr val="lt1"/>
-    </dgm:linClrLst>
-    <dgm:effectClrLst/>
-    <dgm:txLinClrLst/>
-    <dgm:txFillClrLst/>
-    <dgm:txEffectClrLst/>
-  </dgm:styleLbl>
-  <dgm:styleLbl name="lnNode1">
-    <dgm:fillClrLst meth="repeat">
-      <a:schemeClr val="accent1"/>
-    </dgm:fillClrLst>
-    <dgm:linClrLst meth="repeat">
-      <a:schemeClr val="lt1"/>
-    </dgm:linClrLst>
-    <dgm:effectClrLst/>
-    <dgm:txLinClrLst/>
-    <dgm:txFillClrLst/>
-    <dgm:txEffectClrLst/>
-  </dgm:styleLbl>
-  <dgm:styleLbl name="vennNode1">
+  <dgm:styleLbl name="alignAccFollowNode1">
     <dgm:fillClrLst meth="repeat">
       <a:schemeClr val="accent1">
-        <a:alpha val="50000"/>
+        <a:alpha val="90000"/>
+        <a:tint val="40000"/>
       </a:schemeClr>
     </dgm:fillClrLst>
     <dgm:linClrLst meth="repeat">
-      <a:schemeClr val="lt1"/>
-    </dgm:linClrLst>
-    <dgm:effectClrLst/>
-    <dgm:txLinClrLst/>
-    <dgm:txFillClrLst/>
-    <dgm:txEffectClrLst/>
-  </dgm:styleLbl>
-  <dgm:styleLbl name="node2">
-    <dgm:fillClrLst meth="repeat">
-      <a:schemeClr val="accent1"/>
-    </dgm:fillClrLst>
-    <dgm:linClrLst meth="repeat">
-      <a:schemeClr val="lt1"/>
-    </dgm:linClrLst>
-    <dgm:effectClrLst/>
-    <dgm:txLinClrLst/>
-    <dgm:txFillClrLst/>
-    <dgm:txEffectClrLst/>
-  </dgm:styleLbl>
-  <dgm:styleLbl name="node3">
-    <dgm:fillClrLst meth="repeat">
-      <a:schemeClr val="accent1"/>
-    </dgm:fillClrLst>
-    <dgm:linClrLst meth="repeat">
-      <a:schemeClr val="lt1"/>
-    </dgm:linClrLst>
-    <dgm:effectClrLst/>
-    <dgm:txLinClrLst/>
-    <dgm:txFillClrLst/>
-    <dgm:txEffectClrLst/>
-  </dgm:styleLbl>
-  <dgm:styleLbl name="node4">
-    <dgm:fillClrLst meth="repeat">
-      <a:schemeClr val="accent1"/>
-    </dgm:fillClrLst>
-    <dgm:linClrLst meth="repeat">
-      <a:schemeClr val="lt1"/>
-    </dgm:linClrLst>
-    <dgm:effectClrLst/>
-    <dgm:txLinClrLst/>
-    <dgm:txFillClrLst/>
-    <dgm:txEffectClrLst/>
-  </dgm:styleLbl>
-  <dgm:styleLbl name="fgImgPlace1">
-    <dgm:fillClrLst meth="repeat">
       <a:schemeClr val="accent1">
-        <a:tint val="50000"/>
+        <a:alpha val="90000"/>
+        <a:tint val="40000"/>
       </a:schemeClr>
-    </dgm:fillClrLst>
-    <dgm:linClrLst meth="repeat">
-      <a:schemeClr val="lt1"/>
     </dgm:linClrLst>
     <dgm:effectClrLst/>
     <dgm:txLinClrLst/>
     <dgm:txFillClrLst meth="repeat">
-      <a:schemeClr val="lt1"/>
+      <a:schemeClr val="dk1"/>
     </dgm:txFillClrLst>
     <dgm:txEffectClrLst/>
   </dgm:styleLbl>
@@ -263,71 +185,7 @@
     </dgm:txFillClrLst>
     <dgm:txEffectClrLst/>
   </dgm:styleLbl>
-  <dgm:styleLbl name="bgImgPlace1">
-    <dgm:fillClrLst meth="repeat">
-      <a:schemeClr val="accent1">
-        <a:tint val="50000"/>
-      </a:schemeClr>
-    </dgm:fillClrLst>
-    <dgm:linClrLst meth="repeat">
-      <a:schemeClr val="lt1"/>
-    </dgm:linClrLst>
-    <dgm:effectClrLst/>
-    <dgm:txLinClrLst/>
-    <dgm:txFillClrLst meth="repeat">
-      <a:schemeClr val="lt1"/>
-    </dgm:txFillClrLst>
-    <dgm:txEffectClrLst/>
-  </dgm:styleLbl>
-  <dgm:styleLbl name="sibTrans2D1">
-    <dgm:fillClrLst meth="repeat">
-      <a:schemeClr val="accent1">
-        <a:tint val="60000"/>
-      </a:schemeClr>
-    </dgm:fillClrLst>
-    <dgm:linClrLst meth="repeat">
-      <a:schemeClr val="accent1">
-        <a:tint val="60000"/>
-      </a:schemeClr>
-    </dgm:linClrLst>
-    <dgm:effectClrLst/>
-    <dgm:txLinClrLst/>
-    <dgm:txFillClrLst/>
-    <dgm:txEffectClrLst/>
-  </dgm:styleLbl>
-  <dgm:styleLbl name="fgSibTrans2D1">
-    <dgm:fillClrLst meth="repeat">
-      <a:schemeClr val="accent1">
-        <a:tint val="60000"/>
-      </a:schemeClr>
-    </dgm:fillClrLst>
-    <dgm:linClrLst meth="repeat">
-      <a:schemeClr val="accent1">
-        <a:tint val="60000"/>
-      </a:schemeClr>
-    </dgm:linClrLst>
-    <dgm:effectClrLst/>
-    <dgm:txLinClrLst/>
-    <dgm:txFillClrLst/>
-    <dgm:txEffectClrLst/>
-  </dgm:styleLbl>
-  <dgm:styleLbl name="bgSibTrans2D1">
-    <dgm:fillClrLst meth="repeat">
-      <a:schemeClr val="accent1">
-        <a:tint val="60000"/>
-      </a:schemeClr>
-    </dgm:fillClrLst>
-    <dgm:linClrLst meth="repeat">
-      <a:schemeClr val="accent1">
-        <a:tint val="60000"/>
-      </a:schemeClr>
-    </dgm:linClrLst>
-    <dgm:effectClrLst/>
-    <dgm:txLinClrLst/>
-    <dgm:txFillClrLst/>
-    <dgm:txEffectClrLst/>
-  </dgm:styleLbl>
-  <dgm:styleLbl name="sibTrans1D1">
+  <dgm:styleLbl name="alignNode1">
     <dgm:fillClrLst meth="repeat">
       <a:schemeClr val="accent1"/>
     </dgm:fillClrLst>
@@ -336,25 +194,7 @@
     </dgm:linClrLst>
     <dgm:effectClrLst/>
     <dgm:txLinClrLst/>
-    <dgm:txFillClrLst meth="repeat">
-      <a:schemeClr val="tx1"/>
-    </dgm:txFillClrLst>
-    <dgm:txEffectClrLst/>
-  </dgm:styleLbl>
-  <dgm:styleLbl name="callout">
-    <dgm:fillClrLst meth="repeat">
-      <a:schemeClr val="accent1"/>
-    </dgm:fillClrLst>
-    <dgm:linClrLst meth="repeat">
-      <a:schemeClr val="accent1">
-        <a:tint val="50000"/>
-      </a:schemeClr>
-    </dgm:linClrLst>
-    <dgm:effectClrLst/>
-    <dgm:txLinClrLst/>
-    <dgm:txFillClrLst meth="repeat">
-      <a:schemeClr val="tx1"/>
-    </dgm:txFillClrLst>
+    <dgm:txFillClrLst/>
     <dgm:txEffectClrLst/>
   </dgm:styleLbl>
   <dgm:styleLbl name="asst0">
@@ -417,7 +257,75 @@
     <dgm:txFillClrLst/>
     <dgm:txEffectClrLst/>
   </dgm:styleLbl>
-  <dgm:styleLbl name="parChTrans2D1">
+  <dgm:styleLbl name="bgAcc1">
+    <dgm:fillClrLst meth="repeat">
+      <a:schemeClr val="lt1">
+        <a:alpha val="90000"/>
+      </a:schemeClr>
+    </dgm:fillClrLst>
+    <dgm:linClrLst meth="repeat">
+      <a:schemeClr val="accent1"/>
+    </dgm:linClrLst>
+    <dgm:effectClrLst/>
+    <dgm:txLinClrLst/>
+    <dgm:txFillClrLst meth="repeat">
+      <a:schemeClr val="dk1"/>
+    </dgm:txFillClrLst>
+    <dgm:txEffectClrLst/>
+  </dgm:styleLbl>
+  <dgm:styleLbl name="bgAccFollowNode1">
+    <dgm:fillClrLst meth="repeat">
+      <a:schemeClr val="accent1">
+        <a:alpha val="90000"/>
+        <a:tint val="40000"/>
+      </a:schemeClr>
+    </dgm:fillClrLst>
+    <dgm:linClrLst meth="repeat">
+      <a:schemeClr val="accent1">
+        <a:alpha val="90000"/>
+        <a:tint val="40000"/>
+      </a:schemeClr>
+    </dgm:linClrLst>
+    <dgm:effectClrLst/>
+    <dgm:txLinClrLst/>
+    <dgm:txFillClrLst meth="repeat">
+      <a:schemeClr val="dk1"/>
+    </dgm:txFillClrLst>
+    <dgm:txEffectClrLst/>
+  </dgm:styleLbl>
+  <dgm:styleLbl name="bgImgPlace1">
+    <dgm:fillClrLst meth="repeat">
+      <a:schemeClr val="accent1">
+        <a:tint val="50000"/>
+      </a:schemeClr>
+    </dgm:fillClrLst>
+    <dgm:linClrLst meth="repeat">
+      <a:schemeClr val="lt1"/>
+    </dgm:linClrLst>
+    <dgm:effectClrLst/>
+    <dgm:txLinClrLst/>
+    <dgm:txFillClrLst meth="repeat">
+      <a:schemeClr val="lt1"/>
+    </dgm:txFillClrLst>
+    <dgm:txEffectClrLst/>
+  </dgm:styleLbl>
+  <dgm:styleLbl name="bgShp">
+    <dgm:fillClrLst meth="repeat">
+      <a:schemeClr val="accent1">
+        <a:tint val="40000"/>
+      </a:schemeClr>
+    </dgm:fillClrLst>
+    <dgm:linClrLst meth="repeat">
+      <a:schemeClr val="accent1"/>
+    </dgm:linClrLst>
+    <dgm:effectClrLst/>
+    <dgm:txLinClrLst/>
+    <dgm:txFillClrLst meth="repeat">
+      <a:schemeClr val="dk1"/>
+    </dgm:txFillClrLst>
+    <dgm:txEffectClrLst/>
+  </dgm:styleLbl>
+  <dgm:styleLbl name="bgSibTrans2D1">
     <dgm:fillClrLst meth="repeat">
       <a:schemeClr val="accent1">
         <a:tint val="60000"/>
@@ -430,14 +338,46 @@
     </dgm:linClrLst>
     <dgm:effectClrLst/>
     <dgm:txLinClrLst/>
+    <dgm:txFillClrLst/>
+    <dgm:txEffectClrLst/>
+  </dgm:styleLbl>
+  <dgm:styleLbl name="callout">
+    <dgm:fillClrLst meth="repeat">
+      <a:schemeClr val="accent1"/>
+    </dgm:fillClrLst>
+    <dgm:linClrLst meth="repeat">
+      <a:schemeClr val="accent1">
+        <a:tint val="50000"/>
+      </a:schemeClr>
+    </dgm:linClrLst>
+    <dgm:effectClrLst/>
+    <dgm:txLinClrLst/>
     <dgm:txFillClrLst meth="repeat">
-      <a:schemeClr val="lt1"/>
+      <a:schemeClr val="tx1"/>
     </dgm:txFillClrLst>
     <dgm:txEffectClrLst/>
   </dgm:styleLbl>
-  <dgm:styleLbl name="parChTrans2D2">
+  <dgm:styleLbl name="conFgAcc1">
     <dgm:fillClrLst meth="repeat">
+      <a:schemeClr val="lt1">
+        <a:alpha val="90000"/>
+      </a:schemeClr>
+    </dgm:fillClrLst>
+    <dgm:linClrLst meth="repeat">
       <a:schemeClr val="accent1"/>
+    </dgm:linClrLst>
+    <dgm:effectClrLst/>
+    <dgm:txLinClrLst/>
+    <dgm:txFillClrLst meth="repeat">
+      <a:schemeClr val="dk1"/>
+    </dgm:txFillClrLst>
+    <dgm:txEffectClrLst/>
+  </dgm:styleLbl>
+  <dgm:styleLbl name="dkBgShp">
+    <dgm:fillClrLst meth="repeat">
+      <a:schemeClr val="accent1">
+        <a:shade val="80000"/>
+      </a:schemeClr>
     </dgm:fillClrLst>
     <dgm:linClrLst meth="repeat">
       <a:schemeClr val="accent1"/>
@@ -449,12 +389,114 @@
     </dgm:txFillClrLst>
     <dgm:txEffectClrLst/>
   </dgm:styleLbl>
-  <dgm:styleLbl name="parChTrans2D3">
+  <dgm:styleLbl name="fgAcc0">
     <dgm:fillClrLst meth="repeat">
-      <a:schemeClr val="accent1"/>
+      <a:schemeClr val="lt1">
+        <a:alpha val="90000"/>
+      </a:schemeClr>
     </dgm:fillClrLst>
     <dgm:linClrLst meth="repeat">
       <a:schemeClr val="accent1"/>
+    </dgm:linClrLst>
+    <dgm:effectClrLst/>
+    <dgm:txLinClrLst/>
+    <dgm:txFillClrLst meth="repeat">
+      <a:schemeClr val="dk1"/>
+    </dgm:txFillClrLst>
+    <dgm:txEffectClrLst/>
+  </dgm:styleLbl>
+  <dgm:styleLbl name="fgAcc1">
+    <dgm:fillClrLst meth="repeat">
+      <a:schemeClr val="lt1">
+        <a:alpha val="90000"/>
+      </a:schemeClr>
+    </dgm:fillClrLst>
+    <dgm:linClrLst meth="repeat">
+      <a:schemeClr val="accent1"/>
+    </dgm:linClrLst>
+    <dgm:effectClrLst/>
+    <dgm:txLinClrLst/>
+    <dgm:txFillClrLst meth="repeat">
+      <a:schemeClr val="dk1"/>
+    </dgm:txFillClrLst>
+    <dgm:txEffectClrLst/>
+  </dgm:styleLbl>
+  <dgm:styleLbl name="fgAcc2">
+    <dgm:fillClrLst meth="repeat">
+      <a:schemeClr val="lt1">
+        <a:alpha val="90000"/>
+      </a:schemeClr>
+    </dgm:fillClrLst>
+    <dgm:linClrLst meth="repeat">
+      <a:schemeClr val="accent1"/>
+    </dgm:linClrLst>
+    <dgm:effectClrLst/>
+    <dgm:txLinClrLst/>
+    <dgm:txFillClrLst meth="repeat">
+      <a:schemeClr val="dk1"/>
+    </dgm:txFillClrLst>
+    <dgm:txEffectClrLst/>
+  </dgm:styleLbl>
+  <dgm:styleLbl name="fgAcc3">
+    <dgm:fillClrLst meth="repeat">
+      <a:schemeClr val="lt1">
+        <a:alpha val="90000"/>
+      </a:schemeClr>
+    </dgm:fillClrLst>
+    <dgm:linClrLst meth="repeat">
+      <a:schemeClr val="accent1"/>
+    </dgm:linClrLst>
+    <dgm:effectClrLst/>
+    <dgm:txLinClrLst/>
+    <dgm:txFillClrLst meth="repeat">
+      <a:schemeClr val="dk1"/>
+    </dgm:txFillClrLst>
+    <dgm:txEffectClrLst/>
+  </dgm:styleLbl>
+  <dgm:styleLbl name="fgAcc4">
+    <dgm:fillClrLst meth="repeat">
+      <a:schemeClr val="lt1">
+        <a:alpha val="90000"/>
+      </a:schemeClr>
+    </dgm:fillClrLst>
+    <dgm:linClrLst meth="repeat">
+      <a:schemeClr val="accent1"/>
+    </dgm:linClrLst>
+    <dgm:effectClrLst/>
+    <dgm:txLinClrLst/>
+    <dgm:txFillClrLst meth="repeat">
+      <a:schemeClr val="dk1"/>
+    </dgm:txFillClrLst>
+    <dgm:txEffectClrLst/>
+  </dgm:styleLbl>
+  <dgm:styleLbl name="fgAccFollowNode1">
+    <dgm:fillClrLst meth="repeat">
+      <a:schemeClr val="accent1">
+        <a:alpha val="90000"/>
+        <a:tint val="40000"/>
+      </a:schemeClr>
+    </dgm:fillClrLst>
+    <dgm:linClrLst meth="repeat">
+      <a:schemeClr val="accent1">
+        <a:alpha val="90000"/>
+        <a:tint val="40000"/>
+      </a:schemeClr>
+    </dgm:linClrLst>
+    <dgm:effectClrLst/>
+    <dgm:txLinClrLst/>
+    <dgm:txFillClrLst meth="repeat">
+      <a:schemeClr val="dk1"/>
+    </dgm:txFillClrLst>
+    <dgm:txEffectClrLst/>
+  </dgm:styleLbl>
+  <dgm:styleLbl name="fgImgPlace1">
+    <dgm:fillClrLst meth="repeat">
+      <a:schemeClr val="accent1">
+        <a:tint val="50000"/>
+      </a:schemeClr>
+    </dgm:fillClrLst>
+    <dgm:linClrLst meth="repeat">
+      <a:schemeClr val="lt1"/>
     </dgm:linClrLst>
     <dgm:effectClrLst/>
     <dgm:txLinClrLst/>
@@ -463,18 +505,108 @@
     </dgm:txFillClrLst>
     <dgm:txEffectClrLst/>
   </dgm:styleLbl>
-  <dgm:styleLbl name="parChTrans2D4">
+  <dgm:styleLbl name="fgShp">
+    <dgm:fillClrLst meth="repeat">
+      <a:schemeClr val="accent1">
+        <a:tint val="60000"/>
+      </a:schemeClr>
+    </dgm:fillClrLst>
+    <dgm:linClrLst meth="repeat">
+      <a:schemeClr val="lt1"/>
+    </dgm:linClrLst>
+    <dgm:effectClrLst/>
+    <dgm:txLinClrLst/>
+    <dgm:txFillClrLst meth="repeat">
+      <a:schemeClr val="dk1"/>
+    </dgm:txFillClrLst>
+    <dgm:txEffectClrLst/>
+  </dgm:styleLbl>
+  <dgm:styleLbl name="fgSibTrans2D1">
+    <dgm:fillClrLst meth="repeat">
+      <a:schemeClr val="accent1">
+        <a:tint val="60000"/>
+      </a:schemeClr>
+    </dgm:fillClrLst>
+    <dgm:linClrLst meth="repeat">
+      <a:schemeClr val="accent1">
+        <a:tint val="60000"/>
+      </a:schemeClr>
+    </dgm:linClrLst>
+    <dgm:effectClrLst/>
+    <dgm:txLinClrLst/>
+    <dgm:txFillClrLst/>
+    <dgm:txEffectClrLst/>
+  </dgm:styleLbl>
+  <dgm:styleLbl name="lnNode1">
     <dgm:fillClrLst meth="repeat">
       <a:schemeClr val="accent1"/>
     </dgm:fillClrLst>
     <dgm:linClrLst meth="repeat">
-      <a:schemeClr val="accent1"/>
+      <a:schemeClr val="lt1"/>
     </dgm:linClrLst>
     <dgm:effectClrLst/>
     <dgm:txLinClrLst/>
-    <dgm:txFillClrLst meth="repeat">
+    <dgm:txFillClrLst/>
+    <dgm:txEffectClrLst/>
+  </dgm:styleLbl>
+  <dgm:styleLbl name="node0">
+    <dgm:fillClrLst meth="repeat">
+      <a:schemeClr val="accent1"/>
+    </dgm:fillClrLst>
+    <dgm:linClrLst meth="repeat">
       <a:schemeClr val="lt1"/>
-    </dgm:txFillClrLst>
+    </dgm:linClrLst>
+    <dgm:effectClrLst/>
+    <dgm:txLinClrLst/>
+    <dgm:txFillClrLst/>
+    <dgm:txEffectClrLst/>
+  </dgm:styleLbl>
+  <dgm:styleLbl name="node1">
+    <dgm:fillClrLst meth="repeat">
+      <a:schemeClr val="accent1"/>
+    </dgm:fillClrLst>
+    <dgm:linClrLst meth="repeat">
+      <a:schemeClr val="lt1"/>
+    </dgm:linClrLst>
+    <dgm:effectClrLst/>
+    <dgm:txLinClrLst/>
+    <dgm:txFillClrLst/>
+    <dgm:txEffectClrLst/>
+  </dgm:styleLbl>
+  <dgm:styleLbl name="node2">
+    <dgm:fillClrLst meth="repeat">
+      <a:schemeClr val="accent1"/>
+    </dgm:fillClrLst>
+    <dgm:linClrLst meth="repeat">
+      <a:schemeClr val="lt1"/>
+    </dgm:linClrLst>
+    <dgm:effectClrLst/>
+    <dgm:txLinClrLst/>
+    <dgm:txFillClrLst/>
+    <dgm:txEffectClrLst/>
+  </dgm:styleLbl>
+  <dgm:styleLbl name="node3">
+    <dgm:fillClrLst meth="repeat">
+      <a:schemeClr val="accent1"/>
+    </dgm:fillClrLst>
+    <dgm:linClrLst meth="repeat">
+      <a:schemeClr val="lt1"/>
+    </dgm:linClrLst>
+    <dgm:effectClrLst/>
+    <dgm:txLinClrLst/>
+    <dgm:txFillClrLst/>
+    <dgm:txEffectClrLst/>
+  </dgm:styleLbl>
+  <dgm:styleLbl name="node4">
+    <dgm:fillClrLst meth="repeat">
+      <a:schemeClr val="accent1"/>
+    </dgm:fillClrLst>
+    <dgm:linClrLst meth="repeat">
+      <a:schemeClr val="lt1"/>
+    </dgm:linClrLst>
+    <dgm:effectClrLst/>
+    <dgm:txLinClrLst/>
+    <dgm:txFillClrLst/>
     <dgm:txEffectClrLst/>
   </dgm:styleLbl>
   <dgm:styleLbl name="parChTrans1D1">
@@ -541,11 +673,27 @@
     </dgm:txFillClrLst>
     <dgm:txEffectClrLst/>
   </dgm:styleLbl>
-  <dgm:styleLbl name="fgAcc1">
+  <dgm:styleLbl name="parChTrans2D1">
     <dgm:fillClrLst meth="repeat">
-      <a:schemeClr val="lt1">
-        <a:alpha val="90000"/>
+      <a:schemeClr val="accent1">
+        <a:tint val="60000"/>
       </a:schemeClr>
+    </dgm:fillClrLst>
+    <dgm:linClrLst meth="repeat">
+      <a:schemeClr val="accent1">
+        <a:tint val="60000"/>
+      </a:schemeClr>
+    </dgm:linClrLst>
+    <dgm:effectClrLst/>
+    <dgm:txLinClrLst/>
+    <dgm:txFillClrLst meth="repeat">
+      <a:schemeClr val="lt1"/>
+    </dgm:txFillClrLst>
+    <dgm:txEffectClrLst/>
+  </dgm:styleLbl>
+  <dgm:styleLbl name="parChTrans2D2">
+    <dgm:fillClrLst meth="repeat">
+      <a:schemeClr val="accent1"/>
     </dgm:fillClrLst>
     <dgm:linClrLst meth="repeat">
       <a:schemeClr val="accent1"/>
@@ -553,15 +701,13 @@
     <dgm:effectClrLst/>
     <dgm:txLinClrLst/>
     <dgm:txFillClrLst meth="repeat">
-      <a:schemeClr val="dk1"/>
+      <a:schemeClr val="lt1"/>
     </dgm:txFillClrLst>
     <dgm:txEffectClrLst/>
   </dgm:styleLbl>
-  <dgm:styleLbl name="conFgAcc1">
+  <dgm:styleLbl name="parChTrans2D3">
     <dgm:fillClrLst meth="repeat">
-      <a:schemeClr val="lt1">
-        <a:alpha val="90000"/>
-      </a:schemeClr>
+      <a:schemeClr val="accent1"/>
     </dgm:fillClrLst>
     <dgm:linClrLst meth="repeat">
       <a:schemeClr val="accent1"/>
@@ -569,15 +715,13 @@
     <dgm:effectClrLst/>
     <dgm:txLinClrLst/>
     <dgm:txFillClrLst meth="repeat">
-      <a:schemeClr val="dk1"/>
+      <a:schemeClr val="lt1"/>
     </dgm:txFillClrLst>
     <dgm:txEffectClrLst/>
   </dgm:styleLbl>
-  <dgm:styleLbl name="alignAcc1">
+  <dgm:styleLbl name="parChTrans2D4">
     <dgm:fillClrLst meth="repeat">
-      <a:schemeClr val="lt1">
-        <a:alpha val="90000"/>
-      </a:schemeClr>
+      <a:schemeClr val="accent1"/>
     </dgm:fillClrLst>
     <dgm:linClrLst meth="repeat">
       <a:schemeClr val="accent1"/>
@@ -585,15 +729,31 @@
     <dgm:effectClrLst/>
     <dgm:txLinClrLst/>
     <dgm:txFillClrLst meth="repeat">
-      <a:schemeClr val="dk1"/>
+      <a:schemeClr val="lt1"/>
     </dgm:txFillClrLst>
     <dgm:txEffectClrLst/>
   </dgm:styleLbl>
-  <dgm:styleLbl name="trAlignAcc1">
+  <dgm:styleLbl name="revTx">
     <dgm:fillClrLst meth="repeat">
       <a:schemeClr val="lt1">
-        <a:alpha val="40000"/>
+        <a:alpha val="0"/>
       </a:schemeClr>
+    </dgm:fillClrLst>
+    <dgm:linClrLst meth="repeat">
+      <a:schemeClr val="dk1">
+        <a:alpha val="0"/>
+      </a:schemeClr>
+    </dgm:linClrLst>
+    <dgm:effectClrLst/>
+    <dgm:txLinClrLst/>
+    <dgm:txFillClrLst meth="repeat">
+      <a:schemeClr val="tx1"/>
+    </dgm:txFillClrLst>
+    <dgm:txEffectClrLst/>
+  </dgm:styleLbl>
+  <dgm:styleLbl name="sibTrans1D1">
+    <dgm:fillClrLst meth="repeat">
+      <a:schemeClr val="accent1"/>
     </dgm:fillClrLst>
     <dgm:linClrLst meth="repeat">
       <a:schemeClr val="accent1"/>
@@ -601,38 +761,24 @@
     <dgm:effectClrLst/>
     <dgm:txLinClrLst/>
     <dgm:txFillClrLst meth="repeat">
-      <a:schemeClr val="dk1"/>
+      <a:schemeClr val="tx1"/>
     </dgm:txFillClrLst>
     <dgm:txEffectClrLst/>
   </dgm:styleLbl>
-  <dgm:styleLbl name="bgAcc1">
+  <dgm:styleLbl name="sibTrans2D1">
     <dgm:fillClrLst meth="repeat">
-      <a:schemeClr val="lt1">
-        <a:alpha val="90000"/>
+      <a:schemeClr val="accent1">
+        <a:tint val="60000"/>
       </a:schemeClr>
     </dgm:fillClrLst>
     <dgm:linClrLst meth="repeat">
-      <a:schemeClr val="accent1"/>
+      <a:schemeClr val="accent1">
+        <a:tint val="60000"/>
+      </a:schemeClr>
     </dgm:linClrLst>
     <dgm:effectClrLst/>
     <dgm:txLinClrLst/>
-    <dgm:txFillClrLst meth="repeat">
-      <a:schemeClr val="dk1"/>
-    </dgm:txFillClrLst>
-    <dgm:txEffectClrLst/>
-  </dgm:styleLbl>
-  <dgm:styleLbl name="solidFgAcc1">
-    <dgm:fillClrLst meth="repeat">
-      <a:schemeClr val="lt1"/>
-    </dgm:fillClrLst>
-    <dgm:linClrLst meth="repeat">
-      <a:schemeClr val="accent1"/>
-    </dgm:linClrLst>
-    <dgm:effectClrLst/>
-    <dgm:txLinClrLst/>
-    <dgm:txFillClrLst meth="repeat">
-      <a:schemeClr val="dk1"/>
-    </dgm:txFillClrLst>
+    <dgm:txFillClrLst/>
     <dgm:txEffectClrLst/>
   </dgm:styleLbl>
   <dgm:styleLbl name="solidAlignAcc1">
@@ -663,71 +809,9 @@
     </dgm:txFillClrLst>
     <dgm:txEffectClrLst/>
   </dgm:styleLbl>
-  <dgm:styleLbl name="fgAccFollowNode1">
+  <dgm:styleLbl name="solidFgAcc1">
     <dgm:fillClrLst meth="repeat">
-      <a:schemeClr val="accent1">
-        <a:alpha val="90000"/>
-        <a:tint val="40000"/>
-      </a:schemeClr>
-    </dgm:fillClrLst>
-    <dgm:linClrLst meth="repeat">
-      <a:schemeClr val="accent1">
-        <a:alpha val="90000"/>
-        <a:tint val="40000"/>
-      </a:schemeClr>
-    </dgm:linClrLst>
-    <dgm:effectClrLst/>
-    <dgm:txLinClrLst/>
-    <dgm:txFillClrLst meth="repeat">
-      <a:schemeClr val="dk1"/>
-    </dgm:txFillClrLst>
-    <dgm:txEffectClrLst/>
-  </dgm:styleLbl>
-  <dgm:styleLbl name="alignAccFollowNode1">
-    <dgm:fillClrLst meth="repeat">
-      <a:schemeClr val="accent1">
-        <a:alpha val="90000"/>
-        <a:tint val="40000"/>
-      </a:schemeClr>
-    </dgm:fillClrLst>
-    <dgm:linClrLst meth="repeat">
-      <a:schemeClr val="accent1">
-        <a:alpha val="90000"/>
-        <a:tint val="40000"/>
-      </a:schemeClr>
-    </dgm:linClrLst>
-    <dgm:effectClrLst/>
-    <dgm:txLinClrLst/>
-    <dgm:txFillClrLst meth="repeat">
-      <a:schemeClr val="dk1"/>
-    </dgm:txFillClrLst>
-    <dgm:txEffectClrLst/>
-  </dgm:styleLbl>
-  <dgm:styleLbl name="bgAccFollowNode1">
-    <dgm:fillClrLst meth="repeat">
-      <a:schemeClr val="accent1">
-        <a:alpha val="90000"/>
-        <a:tint val="40000"/>
-      </a:schemeClr>
-    </dgm:fillClrLst>
-    <dgm:linClrLst meth="repeat">
-      <a:schemeClr val="accent1">
-        <a:alpha val="90000"/>
-        <a:tint val="40000"/>
-      </a:schemeClr>
-    </dgm:linClrLst>
-    <dgm:effectClrLst/>
-    <dgm:txLinClrLst/>
-    <dgm:txFillClrLst meth="repeat">
-      <a:schemeClr val="dk1"/>
-    </dgm:txFillClrLst>
-    <dgm:txEffectClrLst/>
-  </dgm:styleLbl>
-  <dgm:styleLbl name="fgAcc0">
-    <dgm:fillClrLst meth="repeat">
-      <a:schemeClr val="lt1">
-        <a:alpha val="90000"/>
-      </a:schemeClr>
+      <a:schemeClr val="lt1"/>
     </dgm:fillClrLst>
     <dgm:linClrLst meth="repeat">
       <a:schemeClr val="accent1"/>
@@ -739,10 +823,10 @@
     </dgm:txFillClrLst>
     <dgm:txEffectClrLst/>
   </dgm:styleLbl>
-  <dgm:styleLbl name="fgAcc2">
+  <dgm:styleLbl name="trAlignAcc1">
     <dgm:fillClrLst meth="repeat">
       <a:schemeClr val="lt1">
-        <a:alpha val="90000"/>
+        <a:alpha val="40000"/>
       </a:schemeClr>
     </dgm:fillClrLst>
     <dgm:linClrLst meth="repeat">
@@ -752,70 +836,6 @@
     <dgm:txLinClrLst/>
     <dgm:txFillClrLst meth="repeat">
       <a:schemeClr val="dk1"/>
-    </dgm:txFillClrLst>
-    <dgm:txEffectClrLst/>
-  </dgm:styleLbl>
-  <dgm:styleLbl name="fgAcc3">
-    <dgm:fillClrLst meth="repeat">
-      <a:schemeClr val="lt1">
-        <a:alpha val="90000"/>
-      </a:schemeClr>
-    </dgm:fillClrLst>
-    <dgm:linClrLst meth="repeat">
-      <a:schemeClr val="accent1"/>
-    </dgm:linClrLst>
-    <dgm:effectClrLst/>
-    <dgm:txLinClrLst/>
-    <dgm:txFillClrLst meth="repeat">
-      <a:schemeClr val="dk1"/>
-    </dgm:txFillClrLst>
-    <dgm:txEffectClrLst/>
-  </dgm:styleLbl>
-  <dgm:styleLbl name="fgAcc4">
-    <dgm:fillClrLst meth="repeat">
-      <a:schemeClr val="lt1">
-        <a:alpha val="90000"/>
-      </a:schemeClr>
-    </dgm:fillClrLst>
-    <dgm:linClrLst meth="repeat">
-      <a:schemeClr val="accent1"/>
-    </dgm:linClrLst>
-    <dgm:effectClrLst/>
-    <dgm:txLinClrLst/>
-    <dgm:txFillClrLst meth="repeat">
-      <a:schemeClr val="dk1"/>
-    </dgm:txFillClrLst>
-    <dgm:txEffectClrLst/>
-  </dgm:styleLbl>
-  <dgm:styleLbl name="bgShp">
-    <dgm:fillClrLst meth="repeat">
-      <a:schemeClr val="accent1">
-        <a:tint val="40000"/>
-      </a:schemeClr>
-    </dgm:fillClrLst>
-    <dgm:linClrLst meth="repeat">
-      <a:schemeClr val="accent1"/>
-    </dgm:linClrLst>
-    <dgm:effectClrLst/>
-    <dgm:txLinClrLst/>
-    <dgm:txFillClrLst meth="repeat">
-      <a:schemeClr val="dk1"/>
-    </dgm:txFillClrLst>
-    <dgm:txEffectClrLst/>
-  </dgm:styleLbl>
-  <dgm:styleLbl name="dkBgShp">
-    <dgm:fillClrLst meth="repeat">
-      <a:schemeClr val="accent1">
-        <a:shade val="80000"/>
-      </a:schemeClr>
-    </dgm:fillClrLst>
-    <dgm:linClrLst meth="repeat">
-      <a:schemeClr val="accent1"/>
-    </dgm:linClrLst>
-    <dgm:effectClrLst/>
-    <dgm:txLinClrLst/>
-    <dgm:txFillClrLst meth="repeat">
-      <a:schemeClr val="lt1"/>
     </dgm:txFillClrLst>
     <dgm:txEffectClrLst/>
   </dgm:styleLbl>
@@ -836,10 +856,10 @@
     </dgm:txFillClrLst>
     <dgm:txEffectClrLst/>
   </dgm:styleLbl>
-  <dgm:styleLbl name="fgShp">
+  <dgm:styleLbl name="vennNode1">
     <dgm:fillClrLst meth="repeat">
       <a:schemeClr val="accent1">
-        <a:tint val="60000"/>
+        <a:alpha val="50000"/>
       </a:schemeClr>
     </dgm:fillClrLst>
     <dgm:linClrLst meth="repeat">
@@ -847,27 +867,7 @@
     </dgm:linClrLst>
     <dgm:effectClrLst/>
     <dgm:txLinClrLst/>
-    <dgm:txFillClrLst meth="repeat">
-      <a:schemeClr val="dk1"/>
-    </dgm:txFillClrLst>
-    <dgm:txEffectClrLst/>
-  </dgm:styleLbl>
-  <dgm:styleLbl name="revTx">
-    <dgm:fillClrLst meth="repeat">
-      <a:schemeClr val="lt1">
-        <a:alpha val="0"/>
-      </a:schemeClr>
-    </dgm:fillClrLst>
-    <dgm:linClrLst meth="repeat">
-      <a:schemeClr val="dk1">
-        <a:alpha val="0"/>
-      </a:schemeClr>
-    </dgm:linClrLst>
-    <dgm:effectClrLst/>
-    <dgm:txLinClrLst/>
-    <dgm:txFillClrLst meth="repeat">
-      <a:schemeClr val="tx1"/>
-    </dgm:txFillClrLst>
+    <dgm:txFillClrLst/>
     <dgm:txEffectClrLst/>
   </dgm:styleLbl>
 </dgm:colorsDef>
@@ -909,7 +909,7 @@
                   <a:srgbClr val="C0C0C0"/>
                 </a:outerShdw>
               </a:effectLst>
-              <a:ea typeface="ＭＳ Ｐゴシック" pitchFamily="34" charset="-128"/>
+              <a:ea typeface="MS PGothic" panose="020B0600070205080204" charset="-128"/>
             </a:rPr>
             <a:t>Byte Stuffing</a:t>
           </a:r>
@@ -917,7 +917,7 @@
         </a:p>
       </dgm:t>
     </dgm:pt>
-    <dgm:pt modelId="{4375EEC5-19F4-B445-B1AA-6B16CC945C71}" type="parTrans" cxnId="{042047B1-54CE-D94E-A0AF-1DA32BC93408}">
+    <dgm:pt modelId="{4375EEC5-19F4-B445-B1AA-6B16CC945C71}" cxnId="{042047B1-54CE-D94E-A0AF-1DA32BC93408}" type="parTrans">
       <dgm:prSet/>
       <dgm:spPr/>
       <dgm:t>
@@ -928,7 +928,7 @@
         </a:p>
       </dgm:t>
     </dgm:pt>
-    <dgm:pt modelId="{3037679B-41A7-884D-84D2-20BFEAA65683}" type="sibTrans" cxnId="{042047B1-54CE-D94E-A0AF-1DA32BC93408}">
+    <dgm:pt modelId="{3037679B-41A7-884D-84D2-20BFEAA65683}" cxnId="{042047B1-54CE-D94E-A0AF-1DA32BC93408}" type="sibTrans">
       <dgm:prSet/>
       <dgm:spPr/>
       <dgm:t>
@@ -963,7 +963,7 @@
         </a:p>
       </dgm:t>
     </dgm:pt>
-    <dgm:pt modelId="{611E8B6F-7C60-914A-A1B7-94702D7075BB}" type="parTrans" cxnId="{7C7F35E0-5FA4-9149-B0A8-FFB7AAB37413}">
+    <dgm:pt modelId="{611E8B6F-7C60-914A-A1B7-94702D7075BB}" cxnId="{7C7F35E0-5FA4-9149-B0A8-FFB7AAB37413}" type="parTrans">
       <dgm:prSet/>
       <dgm:spPr/>
       <dgm:t>
@@ -974,7 +974,7 @@
         </a:p>
       </dgm:t>
     </dgm:pt>
-    <dgm:pt modelId="{791FDA7B-2154-9448-9A04-6BE6186289AD}" type="sibTrans" cxnId="{7C7F35E0-5FA4-9149-B0A8-FFB7AAB37413}">
+    <dgm:pt modelId="{791FDA7B-2154-9448-9A04-6BE6186289AD}" cxnId="{7C7F35E0-5FA4-9149-B0A8-FFB7AAB37413}" type="sibTrans">
       <dgm:prSet/>
       <dgm:spPr/>
       <dgm:t>
@@ -1070,7 +1070,7 @@
   <dgm:whole/>
   <dgm:extLst>
     <a:ext uri="http://schemas.microsoft.com/office/drawing/2008/diagram">
-      <dsp:dataModelExt xmlns:dsp="http://schemas.microsoft.com/office/drawing/2008/diagram" relId="rId6" minVer="http://schemas.openxmlformats.org/drawingml/2006/diagram"/>
+      <dsp:dataModelExt xmlns:dsp="http://schemas.microsoft.com/office/drawing/2008/diagram" relId="rId5" minVer="http://schemas.openxmlformats.org/drawingml/2006/diagram"/>
     </a:ext>
   </dgm:extLst>
 </dgm:dataModel>
@@ -1533,7 +1533,7 @@
           <dgm:alg type="tx"/>
           <dgm:choose name="Name4">
             <dgm:if name="Name5" func="var" arg="dir" op="equ" val="norm">
-              <dgm:shape xmlns:r="http://schemas.openxmlformats.org/officeDocument/2006/relationships" rot="180" type="homePlate" r:blip="" zOrderOff="-1">
+              <dgm:shape xmlns:r="http://schemas.openxmlformats.org/officeDocument/2006/relationships" type="homePlate" r:blip="" rot="180" zOrderOff="-1">
                 <dgm:adjLst/>
               </dgm:shape>
             </dgm:if>
@@ -1580,12 +1580,500 @@
     <a:camera prst="orthographicFront"/>
     <a:lightRig rig="threePt" dir="t"/>
   </dgm:scene3d>
-  <dgm:styleLbl name="node0">
+  <dgm:styleLbl name="alignAcc1">
     <dgm:scene3d>
       <a:camera prst="orthographicFront"/>
       <a:lightRig rig="threePt" dir="t"/>
     </dgm:scene3d>
-    <dgm:sp3d/>
+    <dgm:txPr/>
+    <dgm:style>
+      <a:lnRef idx="1">
+        <a:scrgbClr r="0" g="0" b="0"/>
+      </a:lnRef>
+      <a:fillRef idx="1">
+        <a:scrgbClr r="0" g="0" b="0"/>
+      </a:fillRef>
+      <a:effectRef idx="0">
+        <a:scrgbClr r="0" g="0" b="0"/>
+      </a:effectRef>
+      <a:fontRef idx="minor"/>
+    </dgm:style>
+  </dgm:styleLbl>
+  <dgm:styleLbl name="alignAccFollowNode1">
+    <dgm:scene3d>
+      <a:camera prst="orthographicFront"/>
+      <a:lightRig rig="threePt" dir="t"/>
+    </dgm:scene3d>
+    <dgm:txPr/>
+    <dgm:style>
+      <a:lnRef idx="1">
+        <a:scrgbClr r="0" g="0" b="0"/>
+      </a:lnRef>
+      <a:fillRef idx="1">
+        <a:scrgbClr r="0" g="0" b="0"/>
+      </a:fillRef>
+      <a:effectRef idx="0">
+        <a:scrgbClr r="0" g="0" b="0"/>
+      </a:effectRef>
+      <a:fontRef idx="minor"/>
+    </dgm:style>
+  </dgm:styleLbl>
+  <dgm:styleLbl name="alignImgPlace1">
+    <dgm:scene3d>
+      <a:camera prst="orthographicFront"/>
+      <a:lightRig rig="threePt" dir="t"/>
+    </dgm:scene3d>
+    <dgm:txPr/>
+    <dgm:style>
+      <a:lnRef idx="0">
+        <a:scrgbClr r="0" g="0" b="0"/>
+      </a:lnRef>
+      <a:fillRef idx="1">
+        <a:scrgbClr r="0" g="0" b="0"/>
+      </a:fillRef>
+      <a:effectRef idx="2">
+        <a:scrgbClr r="0" g="0" b="0"/>
+      </a:effectRef>
+      <a:fontRef idx="minor"/>
+    </dgm:style>
+  </dgm:styleLbl>
+  <dgm:styleLbl name="alignNode1">
+    <dgm:scene3d>
+      <a:camera prst="orthographicFront"/>
+      <a:lightRig rig="threePt" dir="t"/>
+    </dgm:scene3d>
+    <dgm:txPr/>
+    <dgm:style>
+      <a:lnRef idx="1">
+        <a:scrgbClr r="0" g="0" b="0"/>
+      </a:lnRef>
+      <a:fillRef idx="3">
+        <a:scrgbClr r="0" g="0" b="0"/>
+      </a:fillRef>
+      <a:effectRef idx="2">
+        <a:scrgbClr r="0" g="0" b="0"/>
+      </a:effectRef>
+      <a:fontRef idx="minor">
+        <a:schemeClr val="lt1"/>
+      </a:fontRef>
+    </dgm:style>
+  </dgm:styleLbl>
+  <dgm:styleLbl name="asst0">
+    <dgm:scene3d>
+      <a:camera prst="orthographicFront"/>
+      <a:lightRig rig="threePt" dir="t"/>
+    </dgm:scene3d>
+    <dgm:txPr/>
+    <dgm:style>
+      <a:lnRef idx="0">
+        <a:scrgbClr r="0" g="0" b="0"/>
+      </a:lnRef>
+      <a:fillRef idx="3">
+        <a:scrgbClr r="0" g="0" b="0"/>
+      </a:fillRef>
+      <a:effectRef idx="2">
+        <a:scrgbClr r="0" g="0" b="0"/>
+      </a:effectRef>
+      <a:fontRef idx="minor">
+        <a:schemeClr val="lt1"/>
+      </a:fontRef>
+    </dgm:style>
+  </dgm:styleLbl>
+  <dgm:styleLbl name="asst1">
+    <dgm:scene3d>
+      <a:camera prst="orthographicFront"/>
+      <a:lightRig rig="threePt" dir="t"/>
+    </dgm:scene3d>
+    <dgm:txPr/>
+    <dgm:style>
+      <a:lnRef idx="0">
+        <a:scrgbClr r="0" g="0" b="0"/>
+      </a:lnRef>
+      <a:fillRef idx="3">
+        <a:scrgbClr r="0" g="0" b="0"/>
+      </a:fillRef>
+      <a:effectRef idx="2">
+        <a:scrgbClr r="0" g="0" b="0"/>
+      </a:effectRef>
+      <a:fontRef idx="minor">
+        <a:schemeClr val="lt1"/>
+      </a:fontRef>
+    </dgm:style>
+  </dgm:styleLbl>
+  <dgm:styleLbl name="asst2">
+    <dgm:scene3d>
+      <a:camera prst="orthographicFront"/>
+      <a:lightRig rig="threePt" dir="t"/>
+    </dgm:scene3d>
+    <dgm:txPr/>
+    <dgm:style>
+      <a:lnRef idx="0">
+        <a:scrgbClr r="0" g="0" b="0"/>
+      </a:lnRef>
+      <a:fillRef idx="3">
+        <a:scrgbClr r="0" g="0" b="0"/>
+      </a:fillRef>
+      <a:effectRef idx="2">
+        <a:scrgbClr r="0" g="0" b="0"/>
+      </a:effectRef>
+      <a:fontRef idx="minor">
+        <a:schemeClr val="lt1"/>
+      </a:fontRef>
+    </dgm:style>
+  </dgm:styleLbl>
+  <dgm:styleLbl name="asst3">
+    <dgm:scene3d>
+      <a:camera prst="orthographicFront"/>
+      <a:lightRig rig="threePt" dir="t"/>
+    </dgm:scene3d>
+    <dgm:txPr/>
+    <dgm:style>
+      <a:lnRef idx="0">
+        <a:scrgbClr r="0" g="0" b="0"/>
+      </a:lnRef>
+      <a:fillRef idx="3">
+        <a:scrgbClr r="0" g="0" b="0"/>
+      </a:fillRef>
+      <a:effectRef idx="2">
+        <a:scrgbClr r="0" g="0" b="0"/>
+      </a:effectRef>
+      <a:fontRef idx="minor">
+        <a:schemeClr val="lt1"/>
+      </a:fontRef>
+    </dgm:style>
+  </dgm:styleLbl>
+  <dgm:styleLbl name="asst4">
+    <dgm:scene3d>
+      <a:camera prst="orthographicFront"/>
+      <a:lightRig rig="threePt" dir="t"/>
+    </dgm:scene3d>
+    <dgm:txPr/>
+    <dgm:style>
+      <a:lnRef idx="0">
+        <a:scrgbClr r="0" g="0" b="0"/>
+      </a:lnRef>
+      <a:fillRef idx="3">
+        <a:scrgbClr r="0" g="0" b="0"/>
+      </a:fillRef>
+      <a:effectRef idx="2">
+        <a:scrgbClr r="0" g="0" b="0"/>
+      </a:effectRef>
+      <a:fontRef idx="minor">
+        <a:schemeClr val="lt1"/>
+      </a:fontRef>
+    </dgm:style>
+  </dgm:styleLbl>
+  <dgm:styleLbl name="bgAcc1">
+    <dgm:scene3d>
+      <a:camera prst="orthographicFront"/>
+      <a:lightRig rig="threePt" dir="t"/>
+    </dgm:scene3d>
+    <dgm:txPr/>
+    <dgm:style>
+      <a:lnRef idx="1">
+        <a:scrgbClr r="0" g="0" b="0"/>
+      </a:lnRef>
+      <a:fillRef idx="1">
+        <a:scrgbClr r="0" g="0" b="0"/>
+      </a:fillRef>
+      <a:effectRef idx="0">
+        <a:scrgbClr r="0" g="0" b="0"/>
+      </a:effectRef>
+      <a:fontRef idx="minor"/>
+    </dgm:style>
+  </dgm:styleLbl>
+  <dgm:styleLbl name="bgAccFollowNode1">
+    <dgm:scene3d>
+      <a:camera prst="orthographicFront"/>
+      <a:lightRig rig="threePt" dir="t"/>
+    </dgm:scene3d>
+    <dgm:txPr/>
+    <dgm:style>
+      <a:lnRef idx="1">
+        <a:scrgbClr r="0" g="0" b="0"/>
+      </a:lnRef>
+      <a:fillRef idx="1">
+        <a:scrgbClr r="0" g="0" b="0"/>
+      </a:fillRef>
+      <a:effectRef idx="0">
+        <a:scrgbClr r="0" g="0" b="0"/>
+      </a:effectRef>
+      <a:fontRef idx="minor"/>
+    </dgm:style>
+  </dgm:styleLbl>
+  <dgm:styleLbl name="bgImgPlace1">
+    <dgm:scene3d>
+      <a:camera prst="orthographicFront"/>
+      <a:lightRig rig="threePt" dir="t"/>
+    </dgm:scene3d>
+    <dgm:txPr/>
+    <dgm:style>
+      <a:lnRef idx="0">
+        <a:scrgbClr r="0" g="0" b="0"/>
+      </a:lnRef>
+      <a:fillRef idx="1">
+        <a:scrgbClr r="0" g="0" b="0"/>
+      </a:fillRef>
+      <a:effectRef idx="2">
+        <a:scrgbClr r="0" g="0" b="0"/>
+      </a:effectRef>
+      <a:fontRef idx="minor"/>
+    </dgm:style>
+  </dgm:styleLbl>
+  <dgm:styleLbl name="bgShp">
+    <dgm:scene3d>
+      <a:camera prst="orthographicFront"/>
+      <a:lightRig rig="threePt" dir="t"/>
+    </dgm:scene3d>
+    <dgm:txPr/>
+    <dgm:style>
+      <a:lnRef idx="0">
+        <a:scrgbClr r="0" g="0" b="0"/>
+      </a:lnRef>
+      <a:fillRef idx="1">
+        <a:scrgbClr r="0" g="0" b="0"/>
+      </a:fillRef>
+      <a:effectRef idx="2">
+        <a:scrgbClr r="0" g="0" b="0"/>
+      </a:effectRef>
+      <a:fontRef idx="minor"/>
+    </dgm:style>
+  </dgm:styleLbl>
+  <dgm:styleLbl name="bgSibTrans2D1">
+    <dgm:scene3d>
+      <a:camera prst="orthographicFront"/>
+      <a:lightRig rig="threePt" dir="t"/>
+    </dgm:scene3d>
+    <dgm:txPr/>
+    <dgm:style>
+      <a:lnRef idx="0">
+        <a:scrgbClr r="0" g="0" b="0"/>
+      </a:lnRef>
+      <a:fillRef idx="3">
+        <a:scrgbClr r="0" g="0" b="0"/>
+      </a:fillRef>
+      <a:effectRef idx="2">
+        <a:scrgbClr r="0" g="0" b="0"/>
+      </a:effectRef>
+      <a:fontRef idx="minor">
+        <a:schemeClr val="lt1"/>
+      </a:fontRef>
+    </dgm:style>
+  </dgm:styleLbl>
+  <dgm:styleLbl name="callout">
+    <dgm:scene3d>
+      <a:camera prst="orthographicFront"/>
+      <a:lightRig rig="threePt" dir="t"/>
+    </dgm:scene3d>
+    <dgm:txPr/>
+    <dgm:style>
+      <a:lnRef idx="2">
+        <a:scrgbClr r="0" g="0" b="0"/>
+      </a:lnRef>
+      <a:fillRef idx="1">
+        <a:scrgbClr r="0" g="0" b="0"/>
+      </a:fillRef>
+      <a:effectRef idx="1">
+        <a:scrgbClr r="0" g="0" b="0"/>
+      </a:effectRef>
+      <a:fontRef idx="minor"/>
+    </dgm:style>
+  </dgm:styleLbl>
+  <dgm:styleLbl name="conFgAcc1">
+    <dgm:scene3d>
+      <a:camera prst="orthographicFront"/>
+      <a:lightRig rig="threePt" dir="t"/>
+    </dgm:scene3d>
+    <dgm:txPr/>
+    <dgm:style>
+      <a:lnRef idx="1">
+        <a:scrgbClr r="0" g="0" b="0"/>
+      </a:lnRef>
+      <a:fillRef idx="1">
+        <a:scrgbClr r="0" g="0" b="0"/>
+      </a:fillRef>
+      <a:effectRef idx="0">
+        <a:scrgbClr r="0" g="0" b="0"/>
+      </a:effectRef>
+      <a:fontRef idx="minor"/>
+    </dgm:style>
+  </dgm:styleLbl>
+  <dgm:styleLbl name="dkBgShp">
+    <dgm:scene3d>
+      <a:camera prst="orthographicFront"/>
+      <a:lightRig rig="threePt" dir="t"/>
+    </dgm:scene3d>
+    <dgm:txPr/>
+    <dgm:style>
+      <a:lnRef idx="0">
+        <a:scrgbClr r="0" g="0" b="0"/>
+      </a:lnRef>
+      <a:fillRef idx="1">
+        <a:scrgbClr r="0" g="0" b="0"/>
+      </a:fillRef>
+      <a:effectRef idx="2">
+        <a:scrgbClr r="0" g="0" b="0"/>
+      </a:effectRef>
+      <a:fontRef idx="minor"/>
+    </dgm:style>
+  </dgm:styleLbl>
+  <dgm:styleLbl name="fgAcc0">
+    <dgm:scene3d>
+      <a:camera prst="orthographicFront"/>
+      <a:lightRig rig="threePt" dir="t"/>
+    </dgm:scene3d>
+    <dgm:txPr/>
+    <dgm:style>
+      <a:lnRef idx="1">
+        <a:scrgbClr r="0" g="0" b="0"/>
+      </a:lnRef>
+      <a:fillRef idx="1">
+        <a:scrgbClr r="0" g="0" b="0"/>
+      </a:fillRef>
+      <a:effectRef idx="0">
+        <a:scrgbClr r="0" g="0" b="0"/>
+      </a:effectRef>
+      <a:fontRef idx="minor"/>
+    </dgm:style>
+  </dgm:styleLbl>
+  <dgm:styleLbl name="fgAcc1">
+    <dgm:scene3d>
+      <a:camera prst="orthographicFront"/>
+      <a:lightRig rig="threePt" dir="t"/>
+    </dgm:scene3d>
+    <dgm:txPr/>
+    <dgm:style>
+      <a:lnRef idx="1">
+        <a:scrgbClr r="0" g="0" b="0"/>
+      </a:lnRef>
+      <a:fillRef idx="1">
+        <a:scrgbClr r="0" g="0" b="0"/>
+      </a:fillRef>
+      <a:effectRef idx="0">
+        <a:scrgbClr r="0" g="0" b="0"/>
+      </a:effectRef>
+      <a:fontRef idx="minor"/>
+    </dgm:style>
+  </dgm:styleLbl>
+  <dgm:styleLbl name="fgAcc2">
+    <dgm:scene3d>
+      <a:camera prst="orthographicFront"/>
+      <a:lightRig rig="threePt" dir="t"/>
+    </dgm:scene3d>
+    <dgm:txPr/>
+    <dgm:style>
+      <a:lnRef idx="1">
+        <a:scrgbClr r="0" g="0" b="0"/>
+      </a:lnRef>
+      <a:fillRef idx="1">
+        <a:scrgbClr r="0" g="0" b="0"/>
+      </a:fillRef>
+      <a:effectRef idx="0">
+        <a:scrgbClr r="0" g="0" b="0"/>
+      </a:effectRef>
+      <a:fontRef idx="minor"/>
+    </dgm:style>
+  </dgm:styleLbl>
+  <dgm:styleLbl name="fgAcc3">
+    <dgm:scene3d>
+      <a:camera prst="orthographicFront"/>
+      <a:lightRig rig="threePt" dir="t"/>
+    </dgm:scene3d>
+    <dgm:txPr/>
+    <dgm:style>
+      <a:lnRef idx="1">
+        <a:scrgbClr r="0" g="0" b="0"/>
+      </a:lnRef>
+      <a:fillRef idx="1">
+        <a:scrgbClr r="0" g="0" b="0"/>
+      </a:fillRef>
+      <a:effectRef idx="0">
+        <a:scrgbClr r="0" g="0" b="0"/>
+      </a:effectRef>
+      <a:fontRef idx="minor"/>
+    </dgm:style>
+  </dgm:styleLbl>
+  <dgm:styleLbl name="fgAcc4">
+    <dgm:scene3d>
+      <a:camera prst="orthographicFront"/>
+      <a:lightRig rig="threePt" dir="t"/>
+    </dgm:scene3d>
+    <dgm:txPr/>
+    <dgm:style>
+      <a:lnRef idx="1">
+        <a:scrgbClr r="0" g="0" b="0"/>
+      </a:lnRef>
+      <a:fillRef idx="1">
+        <a:scrgbClr r="0" g="0" b="0"/>
+      </a:fillRef>
+      <a:effectRef idx="0">
+        <a:scrgbClr r="0" g="0" b="0"/>
+      </a:effectRef>
+      <a:fontRef idx="minor"/>
+    </dgm:style>
+  </dgm:styleLbl>
+  <dgm:styleLbl name="fgAccFollowNode1">
+    <dgm:scene3d>
+      <a:camera prst="orthographicFront"/>
+      <a:lightRig rig="threePt" dir="t"/>
+    </dgm:scene3d>
+    <dgm:txPr/>
+    <dgm:style>
+      <a:lnRef idx="1">
+        <a:scrgbClr r="0" g="0" b="0"/>
+      </a:lnRef>
+      <a:fillRef idx="1">
+        <a:scrgbClr r="0" g="0" b="0"/>
+      </a:fillRef>
+      <a:effectRef idx="0">
+        <a:scrgbClr r="0" g="0" b="0"/>
+      </a:effectRef>
+      <a:fontRef idx="minor"/>
+    </dgm:style>
+  </dgm:styleLbl>
+  <dgm:styleLbl name="fgImgPlace1">
+    <dgm:scene3d>
+      <a:camera prst="orthographicFront"/>
+      <a:lightRig rig="threePt" dir="t"/>
+    </dgm:scene3d>
+    <dgm:txPr/>
+    <dgm:style>
+      <a:lnRef idx="0">
+        <a:scrgbClr r="0" g="0" b="0"/>
+      </a:lnRef>
+      <a:fillRef idx="1">
+        <a:scrgbClr r="0" g="0" b="0"/>
+      </a:fillRef>
+      <a:effectRef idx="2">
+        <a:scrgbClr r="0" g="0" b="0"/>
+      </a:effectRef>
+      <a:fontRef idx="minor"/>
+    </dgm:style>
+  </dgm:styleLbl>
+  <dgm:styleLbl name="fgShp">
+    <dgm:scene3d>
+      <a:camera prst="orthographicFront"/>
+      <a:lightRig rig="threePt" dir="t"/>
+    </dgm:scene3d>
+    <dgm:txPr/>
+    <dgm:style>
+      <a:lnRef idx="0">
+        <a:scrgbClr r="0" g="0" b="0"/>
+      </a:lnRef>
+      <a:fillRef idx="3">
+        <a:scrgbClr r="0" g="0" b="0"/>
+      </a:fillRef>
+      <a:effectRef idx="2">
+        <a:scrgbClr r="0" g="0" b="0"/>
+      </a:effectRef>
+      <a:fontRef idx="minor"/>
+    </dgm:style>
+  </dgm:styleLbl>
+  <dgm:styleLbl name="fgSibTrans2D1">
+    <dgm:scene3d>
+      <a:camera prst="orthographicFront"/>
+      <a:lightRig rig="threePt" dir="t"/>
+    </dgm:scene3d>
     <dgm:txPr/>
     <dgm:style>
       <a:lnRef idx="0">
@@ -1607,7 +2095,6 @@
       <a:camera prst="orthographicFront"/>
       <a:lightRig rig="threePt" dir="t"/>
     </dgm:scene3d>
-    <dgm:sp3d/>
     <dgm:txPr/>
     <dgm:style>
       <a:lnRef idx="1">
@@ -1624,37 +2111,14 @@
       </a:fontRef>
     </dgm:style>
   </dgm:styleLbl>
-  <dgm:styleLbl name="vennNode1">
+  <dgm:styleLbl name="node0">
     <dgm:scene3d>
       <a:camera prst="orthographicFront"/>
       <a:lightRig rig="threePt" dir="t"/>
     </dgm:scene3d>
-    <dgm:sp3d/>
     <dgm:txPr/>
     <dgm:style>
       <a:lnRef idx="0">
-        <a:scrgbClr r="0" g="0" b="0"/>
-      </a:lnRef>
-      <a:fillRef idx="3">
-        <a:scrgbClr r="0" g="0" b="0"/>
-      </a:fillRef>
-      <a:effectRef idx="0">
-        <a:scrgbClr r="0" g="0" b="0"/>
-      </a:effectRef>
-      <a:fontRef idx="minor">
-        <a:schemeClr val="tx1"/>
-      </a:fontRef>
-    </dgm:style>
-  </dgm:styleLbl>
-  <dgm:styleLbl name="alignNode1">
-    <dgm:scene3d>
-      <a:camera prst="orthographicFront"/>
-      <a:lightRig rig="threePt" dir="t"/>
-    </dgm:scene3d>
-    <dgm:sp3d/>
-    <dgm:txPr/>
-    <dgm:style>
-      <a:lnRef idx="1">
         <a:scrgbClr r="0" g="0" b="0"/>
       </a:lnRef>
       <a:fillRef idx="3">
@@ -1673,7 +2137,6 @@
       <a:camera prst="orthographicFront"/>
       <a:lightRig rig="threePt" dir="t"/>
     </dgm:scene3d>
-    <dgm:sp3d/>
     <dgm:txPr/>
     <dgm:style>
       <a:lnRef idx="0">
@@ -1695,7 +2158,6 @@
       <a:camera prst="orthographicFront"/>
       <a:lightRig rig="threePt" dir="t"/>
     </dgm:scene3d>
-    <dgm:sp3d/>
     <dgm:txPr/>
     <dgm:style>
       <a:lnRef idx="0">
@@ -1717,7 +2179,6 @@
       <a:camera prst="orthographicFront"/>
       <a:lightRig rig="threePt" dir="t"/>
     </dgm:scene3d>
-    <dgm:sp3d/>
     <dgm:txPr/>
     <dgm:style>
       <a:lnRef idx="0">
@@ -1739,7 +2200,6 @@
       <a:camera prst="orthographicFront"/>
       <a:lightRig rig="threePt" dir="t"/>
     </dgm:scene3d>
-    <dgm:sp3d/>
     <dgm:txPr/>
     <dgm:style>
       <a:lnRef idx="0">
@@ -1756,138 +2216,68 @@
       </a:fontRef>
     </dgm:style>
   </dgm:styleLbl>
-  <dgm:styleLbl name="fgImgPlace1">
+  <dgm:styleLbl name="parChTrans1D1">
     <dgm:scene3d>
       <a:camera prst="orthographicFront"/>
       <a:lightRig rig="threePt" dir="t"/>
     </dgm:scene3d>
-    <dgm:sp3d/>
     <dgm:txPr/>
     <dgm:style>
-      <a:lnRef idx="0">
+      <a:lnRef idx="1">
         <a:scrgbClr r="0" g="0" b="0"/>
       </a:lnRef>
-      <a:fillRef idx="1">
+      <a:fillRef idx="0">
         <a:scrgbClr r="0" g="0" b="0"/>
       </a:fillRef>
-      <a:effectRef idx="2">
+      <a:effectRef idx="0">
         <a:scrgbClr r="0" g="0" b="0"/>
       </a:effectRef>
       <a:fontRef idx="minor"/>
     </dgm:style>
   </dgm:styleLbl>
-  <dgm:styleLbl name="alignImgPlace1">
+  <dgm:styleLbl name="parChTrans1D2">
     <dgm:scene3d>
       <a:camera prst="orthographicFront"/>
       <a:lightRig rig="threePt" dir="t"/>
     </dgm:scene3d>
-    <dgm:sp3d/>
     <dgm:txPr/>
     <dgm:style>
-      <a:lnRef idx="0">
+      <a:lnRef idx="1">
         <a:scrgbClr r="0" g="0" b="0"/>
       </a:lnRef>
-      <a:fillRef idx="1">
+      <a:fillRef idx="0">
         <a:scrgbClr r="0" g="0" b="0"/>
       </a:fillRef>
-      <a:effectRef idx="2">
+      <a:effectRef idx="0">
         <a:scrgbClr r="0" g="0" b="0"/>
       </a:effectRef>
       <a:fontRef idx="minor"/>
     </dgm:style>
   </dgm:styleLbl>
-  <dgm:styleLbl name="bgImgPlace1">
+  <dgm:styleLbl name="parChTrans1D3">
     <dgm:scene3d>
       <a:camera prst="orthographicFront"/>
       <a:lightRig rig="threePt" dir="t"/>
     </dgm:scene3d>
-    <dgm:sp3d/>
     <dgm:txPr/>
     <dgm:style>
-      <a:lnRef idx="0">
+      <a:lnRef idx="1">
         <a:scrgbClr r="0" g="0" b="0"/>
       </a:lnRef>
-      <a:fillRef idx="1">
+      <a:fillRef idx="0">
         <a:scrgbClr r="0" g="0" b="0"/>
       </a:fillRef>
-      <a:effectRef idx="2">
+      <a:effectRef idx="0">
         <a:scrgbClr r="0" g="0" b="0"/>
       </a:effectRef>
       <a:fontRef idx="minor"/>
     </dgm:style>
   </dgm:styleLbl>
-  <dgm:styleLbl name="sibTrans2D1">
+  <dgm:styleLbl name="parChTrans1D4">
     <dgm:scene3d>
       <a:camera prst="orthographicFront"/>
       <a:lightRig rig="threePt" dir="t"/>
     </dgm:scene3d>
-    <dgm:sp3d/>
-    <dgm:txPr/>
-    <dgm:style>
-      <a:lnRef idx="0">
-        <a:scrgbClr r="0" g="0" b="0"/>
-      </a:lnRef>
-      <a:fillRef idx="3">
-        <a:scrgbClr r="0" g="0" b="0"/>
-      </a:fillRef>
-      <a:effectRef idx="2">
-        <a:scrgbClr r="0" g="0" b="0"/>
-      </a:effectRef>
-      <a:fontRef idx="minor">
-        <a:schemeClr val="lt1"/>
-      </a:fontRef>
-    </dgm:style>
-  </dgm:styleLbl>
-  <dgm:styleLbl name="fgSibTrans2D1">
-    <dgm:scene3d>
-      <a:camera prst="orthographicFront"/>
-      <a:lightRig rig="threePt" dir="t"/>
-    </dgm:scene3d>
-    <dgm:sp3d/>
-    <dgm:txPr/>
-    <dgm:style>
-      <a:lnRef idx="0">
-        <a:scrgbClr r="0" g="0" b="0"/>
-      </a:lnRef>
-      <a:fillRef idx="3">
-        <a:scrgbClr r="0" g="0" b="0"/>
-      </a:fillRef>
-      <a:effectRef idx="2">
-        <a:scrgbClr r="0" g="0" b="0"/>
-      </a:effectRef>
-      <a:fontRef idx="minor">
-        <a:schemeClr val="lt1"/>
-      </a:fontRef>
-    </dgm:style>
-  </dgm:styleLbl>
-  <dgm:styleLbl name="bgSibTrans2D1">
-    <dgm:scene3d>
-      <a:camera prst="orthographicFront"/>
-      <a:lightRig rig="threePt" dir="t"/>
-    </dgm:scene3d>
-    <dgm:sp3d/>
-    <dgm:txPr/>
-    <dgm:style>
-      <a:lnRef idx="0">
-        <a:scrgbClr r="0" g="0" b="0"/>
-      </a:lnRef>
-      <a:fillRef idx="3">
-        <a:scrgbClr r="0" g="0" b="0"/>
-      </a:fillRef>
-      <a:effectRef idx="2">
-        <a:scrgbClr r="0" g="0" b="0"/>
-      </a:effectRef>
-      <a:fontRef idx="minor">
-        <a:schemeClr val="lt1"/>
-      </a:fontRef>
-    </dgm:style>
-  </dgm:styleLbl>
-  <dgm:styleLbl name="sibTrans1D1">
-    <dgm:scene3d>
-      <a:camera prst="orthographicFront"/>
-      <a:lightRig rig="threePt" dir="t"/>
-    </dgm:scene3d>
-    <dgm:sp3d/>
     <dgm:txPr/>
     <dgm:style>
       <a:lnRef idx="1">
@@ -1900,136 +2290,6 @@
         <a:scrgbClr r="0" g="0" b="0"/>
       </a:effectRef>
       <a:fontRef idx="minor"/>
-    </dgm:style>
-  </dgm:styleLbl>
-  <dgm:styleLbl name="callout">
-    <dgm:scene3d>
-      <a:camera prst="orthographicFront"/>
-      <a:lightRig rig="threePt" dir="t"/>
-    </dgm:scene3d>
-    <dgm:sp3d/>
-    <dgm:txPr/>
-    <dgm:style>
-      <a:lnRef idx="2">
-        <a:scrgbClr r="0" g="0" b="0"/>
-      </a:lnRef>
-      <a:fillRef idx="1">
-        <a:scrgbClr r="0" g="0" b="0"/>
-      </a:fillRef>
-      <a:effectRef idx="1">
-        <a:scrgbClr r="0" g="0" b="0"/>
-      </a:effectRef>
-      <a:fontRef idx="minor"/>
-    </dgm:style>
-  </dgm:styleLbl>
-  <dgm:styleLbl name="asst0">
-    <dgm:scene3d>
-      <a:camera prst="orthographicFront"/>
-      <a:lightRig rig="threePt" dir="t"/>
-    </dgm:scene3d>
-    <dgm:sp3d/>
-    <dgm:txPr/>
-    <dgm:style>
-      <a:lnRef idx="0">
-        <a:scrgbClr r="0" g="0" b="0"/>
-      </a:lnRef>
-      <a:fillRef idx="3">
-        <a:scrgbClr r="0" g="0" b="0"/>
-      </a:fillRef>
-      <a:effectRef idx="2">
-        <a:scrgbClr r="0" g="0" b="0"/>
-      </a:effectRef>
-      <a:fontRef idx="minor">
-        <a:schemeClr val="lt1"/>
-      </a:fontRef>
-    </dgm:style>
-  </dgm:styleLbl>
-  <dgm:styleLbl name="asst1">
-    <dgm:scene3d>
-      <a:camera prst="orthographicFront"/>
-      <a:lightRig rig="threePt" dir="t"/>
-    </dgm:scene3d>
-    <dgm:sp3d/>
-    <dgm:txPr/>
-    <dgm:style>
-      <a:lnRef idx="0">
-        <a:scrgbClr r="0" g="0" b="0"/>
-      </a:lnRef>
-      <a:fillRef idx="3">
-        <a:scrgbClr r="0" g="0" b="0"/>
-      </a:fillRef>
-      <a:effectRef idx="2">
-        <a:scrgbClr r="0" g="0" b="0"/>
-      </a:effectRef>
-      <a:fontRef idx="minor">
-        <a:schemeClr val="lt1"/>
-      </a:fontRef>
-    </dgm:style>
-  </dgm:styleLbl>
-  <dgm:styleLbl name="asst2">
-    <dgm:scene3d>
-      <a:camera prst="orthographicFront"/>
-      <a:lightRig rig="threePt" dir="t"/>
-    </dgm:scene3d>
-    <dgm:sp3d/>
-    <dgm:txPr/>
-    <dgm:style>
-      <a:lnRef idx="0">
-        <a:scrgbClr r="0" g="0" b="0"/>
-      </a:lnRef>
-      <a:fillRef idx="3">
-        <a:scrgbClr r="0" g="0" b="0"/>
-      </a:fillRef>
-      <a:effectRef idx="2">
-        <a:scrgbClr r="0" g="0" b="0"/>
-      </a:effectRef>
-      <a:fontRef idx="minor">
-        <a:schemeClr val="lt1"/>
-      </a:fontRef>
-    </dgm:style>
-  </dgm:styleLbl>
-  <dgm:styleLbl name="asst3">
-    <dgm:scene3d>
-      <a:camera prst="orthographicFront"/>
-      <a:lightRig rig="threePt" dir="t"/>
-    </dgm:scene3d>
-    <dgm:sp3d/>
-    <dgm:txPr/>
-    <dgm:style>
-      <a:lnRef idx="0">
-        <a:scrgbClr r="0" g="0" b="0"/>
-      </a:lnRef>
-      <a:fillRef idx="3">
-        <a:scrgbClr r="0" g="0" b="0"/>
-      </a:fillRef>
-      <a:effectRef idx="2">
-        <a:scrgbClr r="0" g="0" b="0"/>
-      </a:effectRef>
-      <a:fontRef idx="minor">
-        <a:schemeClr val="lt1"/>
-      </a:fontRef>
-    </dgm:style>
-  </dgm:styleLbl>
-  <dgm:styleLbl name="asst4">
-    <dgm:scene3d>
-      <a:camera prst="orthographicFront"/>
-      <a:lightRig rig="threePt" dir="t"/>
-    </dgm:scene3d>
-    <dgm:sp3d/>
-    <dgm:txPr/>
-    <dgm:style>
-      <a:lnRef idx="0">
-        <a:scrgbClr r="0" g="0" b="0"/>
-      </a:lnRef>
-      <a:fillRef idx="3">
-        <a:scrgbClr r="0" g="0" b="0"/>
-      </a:fillRef>
-      <a:effectRef idx="2">
-        <a:scrgbClr r="0" g="0" b="0"/>
-      </a:effectRef>
-      <a:fontRef idx="minor">
-        <a:schemeClr val="lt1"/>
-      </a:fontRef>
     </dgm:style>
   </dgm:styleLbl>
   <dgm:styleLbl name="parChTrans2D1">
@@ -2037,7 +2297,6 @@
       <a:camera prst="orthographicFront"/>
       <a:lightRig rig="threePt" dir="t"/>
     </dgm:scene3d>
-    <dgm:sp3d/>
     <dgm:txPr/>
     <dgm:style>
       <a:lnRef idx="0">
@@ -2059,7 +2318,6 @@
       <a:camera prst="orthographicFront"/>
       <a:lightRig rig="threePt" dir="t"/>
     </dgm:scene3d>
-    <dgm:sp3d/>
     <dgm:txPr/>
     <dgm:style>
       <a:lnRef idx="0">
@@ -2081,7 +2339,6 @@
       <a:camera prst="orthographicFront"/>
       <a:lightRig rig="threePt" dir="t"/>
     </dgm:scene3d>
-    <dgm:sp3d/>
     <dgm:txPr/>
     <dgm:style>
       <a:lnRef idx="1">
@@ -2103,7 +2360,6 @@
       <a:camera prst="orthographicFront"/>
       <a:lightRig rig="threePt" dir="t"/>
     </dgm:scene3d>
-    <dgm:sp3d/>
     <dgm:txPr/>
     <dgm:style>
       <a:lnRef idx="1">
@@ -2120,15 +2376,14 @@
       </a:fontRef>
     </dgm:style>
   </dgm:styleLbl>
-  <dgm:styleLbl name="parChTrans1D1">
+  <dgm:styleLbl name="revTx">
     <dgm:scene3d>
       <a:camera prst="orthographicFront"/>
       <a:lightRig rig="threePt" dir="t"/>
     </dgm:scene3d>
-    <dgm:sp3d/>
     <dgm:txPr/>
     <dgm:style>
-      <a:lnRef idx="1">
+      <a:lnRef idx="0">
         <a:scrgbClr r="0" g="0" b="0"/>
       </a:lnRef>
       <a:fillRef idx="0">
@@ -2140,12 +2395,11 @@
       <a:fontRef idx="minor"/>
     </dgm:style>
   </dgm:styleLbl>
-  <dgm:styleLbl name="parChTrans1D2">
+  <dgm:styleLbl name="sibTrans1D1">
     <dgm:scene3d>
       <a:camera prst="orthographicFront"/>
       <a:lightRig rig="threePt" dir="t"/>
     </dgm:scene3d>
-    <dgm:sp3d/>
     <dgm:txPr/>
     <dgm:style>
       <a:lnRef idx="1">
@@ -2160,18 +2414,38 @@
       <a:fontRef idx="minor"/>
     </dgm:style>
   </dgm:styleLbl>
-  <dgm:styleLbl name="parChTrans1D3">
+  <dgm:styleLbl name="sibTrans2D1">
     <dgm:scene3d>
       <a:camera prst="orthographicFront"/>
       <a:lightRig rig="threePt" dir="t"/>
     </dgm:scene3d>
-    <dgm:sp3d/>
+    <dgm:txPr/>
+    <dgm:style>
+      <a:lnRef idx="0">
+        <a:scrgbClr r="0" g="0" b="0"/>
+      </a:lnRef>
+      <a:fillRef idx="3">
+        <a:scrgbClr r="0" g="0" b="0"/>
+      </a:fillRef>
+      <a:effectRef idx="2">
+        <a:scrgbClr r="0" g="0" b="0"/>
+      </a:effectRef>
+      <a:fontRef idx="minor">
+        <a:schemeClr val="lt1"/>
+      </a:fontRef>
+    </dgm:style>
+  </dgm:styleLbl>
+  <dgm:styleLbl name="solidAlignAcc1">
+    <dgm:scene3d>
+      <a:camera prst="orthographicFront"/>
+      <a:lightRig rig="threePt" dir="t"/>
+    </dgm:scene3d>
     <dgm:txPr/>
     <dgm:style>
       <a:lnRef idx="1">
         <a:scrgbClr r="0" g="0" b="0"/>
       </a:lnRef>
-      <a:fillRef idx="0">
+      <a:fillRef idx="1">
         <a:scrgbClr r="0" g="0" b="0"/>
       </a:fillRef>
       <a:effectRef idx="0">
@@ -2180,18 +2454,17 @@
       <a:fontRef idx="minor"/>
     </dgm:style>
   </dgm:styleLbl>
-  <dgm:styleLbl name="parChTrans1D4">
+  <dgm:styleLbl name="solidBgAcc1">
     <dgm:scene3d>
       <a:camera prst="orthographicFront"/>
       <a:lightRig rig="threePt" dir="t"/>
     </dgm:scene3d>
-    <dgm:sp3d/>
     <dgm:txPr/>
     <dgm:style>
       <a:lnRef idx="1">
         <a:scrgbClr r="0" g="0" b="0"/>
       </a:lnRef>
-      <a:fillRef idx="0">
+      <a:fillRef idx="1">
         <a:scrgbClr r="0" g="0" b="0"/>
       </a:fillRef>
       <a:effectRef idx="0">
@@ -2200,52 +2473,11 @@
       <a:fontRef idx="minor"/>
     </dgm:style>
   </dgm:styleLbl>
-  <dgm:styleLbl name="fgAcc1">
+  <dgm:styleLbl name="solidFgAcc1">
     <dgm:scene3d>
       <a:camera prst="orthographicFront"/>
       <a:lightRig rig="threePt" dir="t"/>
     </dgm:scene3d>
-    <dgm:sp3d/>
-    <dgm:txPr/>
-    <dgm:style>
-      <a:lnRef idx="1">
-        <a:scrgbClr r="0" g="0" b="0"/>
-      </a:lnRef>
-      <a:fillRef idx="1">
-        <a:scrgbClr r="0" g="0" b="0"/>
-      </a:fillRef>
-      <a:effectRef idx="0">
-        <a:scrgbClr r="0" g="0" b="0"/>
-      </a:effectRef>
-      <a:fontRef idx="minor"/>
-    </dgm:style>
-  </dgm:styleLbl>
-  <dgm:styleLbl name="conFgAcc1">
-    <dgm:scene3d>
-      <a:camera prst="orthographicFront"/>
-      <a:lightRig rig="threePt" dir="t"/>
-    </dgm:scene3d>
-    <dgm:sp3d/>
-    <dgm:txPr/>
-    <dgm:style>
-      <a:lnRef idx="1">
-        <a:scrgbClr r="0" g="0" b="0"/>
-      </a:lnRef>
-      <a:fillRef idx="1">
-        <a:scrgbClr r="0" g="0" b="0"/>
-      </a:fillRef>
-      <a:effectRef idx="0">
-        <a:scrgbClr r="0" g="0" b="0"/>
-      </a:effectRef>
-      <a:fontRef idx="minor"/>
-    </dgm:style>
-  </dgm:styleLbl>
-  <dgm:styleLbl name="alignAcc1">
-    <dgm:scene3d>
-      <a:camera prst="orthographicFront"/>
-      <a:lightRig rig="threePt" dir="t"/>
-    </dgm:scene3d>
-    <dgm:sp3d/>
     <dgm:txPr/>
     <dgm:style>
       <a:lnRef idx="1">
@@ -2265,7 +2497,6 @@
       <a:camera prst="orthographicFront"/>
       <a:lightRig rig="threePt" dir="t"/>
     </dgm:scene3d>
-    <dgm:sp3d/>
     <dgm:txPr/>
     <dgm:style>
       <a:lnRef idx="1">
@@ -2275,266 +2506,6 @@
         <a:scrgbClr r="0" g="0" b="0"/>
       </a:fillRef>
       <a:effectRef idx="0">
-        <a:scrgbClr r="0" g="0" b="0"/>
-      </a:effectRef>
-      <a:fontRef idx="minor"/>
-    </dgm:style>
-  </dgm:styleLbl>
-  <dgm:styleLbl name="bgAcc1">
-    <dgm:scene3d>
-      <a:camera prst="orthographicFront"/>
-      <a:lightRig rig="threePt" dir="t"/>
-    </dgm:scene3d>
-    <dgm:sp3d/>
-    <dgm:txPr/>
-    <dgm:style>
-      <a:lnRef idx="1">
-        <a:scrgbClr r="0" g="0" b="0"/>
-      </a:lnRef>
-      <a:fillRef idx="1">
-        <a:scrgbClr r="0" g="0" b="0"/>
-      </a:fillRef>
-      <a:effectRef idx="0">
-        <a:scrgbClr r="0" g="0" b="0"/>
-      </a:effectRef>
-      <a:fontRef idx="minor"/>
-    </dgm:style>
-  </dgm:styleLbl>
-  <dgm:styleLbl name="solidFgAcc1">
-    <dgm:scene3d>
-      <a:camera prst="orthographicFront"/>
-      <a:lightRig rig="threePt" dir="t"/>
-    </dgm:scene3d>
-    <dgm:sp3d/>
-    <dgm:txPr/>
-    <dgm:style>
-      <a:lnRef idx="1">
-        <a:scrgbClr r="0" g="0" b="0"/>
-      </a:lnRef>
-      <a:fillRef idx="1">
-        <a:scrgbClr r="0" g="0" b="0"/>
-      </a:fillRef>
-      <a:effectRef idx="0">
-        <a:scrgbClr r="0" g="0" b="0"/>
-      </a:effectRef>
-      <a:fontRef idx="minor"/>
-    </dgm:style>
-  </dgm:styleLbl>
-  <dgm:styleLbl name="solidAlignAcc1">
-    <dgm:scene3d>
-      <a:camera prst="orthographicFront"/>
-      <a:lightRig rig="threePt" dir="t"/>
-    </dgm:scene3d>
-    <dgm:sp3d/>
-    <dgm:txPr/>
-    <dgm:style>
-      <a:lnRef idx="1">
-        <a:scrgbClr r="0" g="0" b="0"/>
-      </a:lnRef>
-      <a:fillRef idx="1">
-        <a:scrgbClr r="0" g="0" b="0"/>
-      </a:fillRef>
-      <a:effectRef idx="0">
-        <a:scrgbClr r="0" g="0" b="0"/>
-      </a:effectRef>
-      <a:fontRef idx="minor"/>
-    </dgm:style>
-  </dgm:styleLbl>
-  <dgm:styleLbl name="solidBgAcc1">
-    <dgm:scene3d>
-      <a:camera prst="orthographicFront"/>
-      <a:lightRig rig="threePt" dir="t"/>
-    </dgm:scene3d>
-    <dgm:sp3d/>
-    <dgm:txPr/>
-    <dgm:style>
-      <a:lnRef idx="1">
-        <a:scrgbClr r="0" g="0" b="0"/>
-      </a:lnRef>
-      <a:fillRef idx="1">
-        <a:scrgbClr r="0" g="0" b="0"/>
-      </a:fillRef>
-      <a:effectRef idx="0">
-        <a:scrgbClr r="0" g="0" b="0"/>
-      </a:effectRef>
-      <a:fontRef idx="minor"/>
-    </dgm:style>
-  </dgm:styleLbl>
-  <dgm:styleLbl name="fgAccFollowNode1">
-    <dgm:scene3d>
-      <a:camera prst="orthographicFront"/>
-      <a:lightRig rig="threePt" dir="t"/>
-    </dgm:scene3d>
-    <dgm:sp3d/>
-    <dgm:txPr/>
-    <dgm:style>
-      <a:lnRef idx="1">
-        <a:scrgbClr r="0" g="0" b="0"/>
-      </a:lnRef>
-      <a:fillRef idx="1">
-        <a:scrgbClr r="0" g="0" b="0"/>
-      </a:fillRef>
-      <a:effectRef idx="0">
-        <a:scrgbClr r="0" g="0" b="0"/>
-      </a:effectRef>
-      <a:fontRef idx="minor"/>
-    </dgm:style>
-  </dgm:styleLbl>
-  <dgm:styleLbl name="alignAccFollowNode1">
-    <dgm:scene3d>
-      <a:camera prst="orthographicFront"/>
-      <a:lightRig rig="threePt" dir="t"/>
-    </dgm:scene3d>
-    <dgm:sp3d/>
-    <dgm:txPr/>
-    <dgm:style>
-      <a:lnRef idx="1">
-        <a:scrgbClr r="0" g="0" b="0"/>
-      </a:lnRef>
-      <a:fillRef idx="1">
-        <a:scrgbClr r="0" g="0" b="0"/>
-      </a:fillRef>
-      <a:effectRef idx="0">
-        <a:scrgbClr r="0" g="0" b="0"/>
-      </a:effectRef>
-      <a:fontRef idx="minor"/>
-    </dgm:style>
-  </dgm:styleLbl>
-  <dgm:styleLbl name="bgAccFollowNode1">
-    <dgm:scene3d>
-      <a:camera prst="orthographicFront"/>
-      <a:lightRig rig="threePt" dir="t"/>
-    </dgm:scene3d>
-    <dgm:sp3d/>
-    <dgm:txPr/>
-    <dgm:style>
-      <a:lnRef idx="1">
-        <a:scrgbClr r="0" g="0" b="0"/>
-      </a:lnRef>
-      <a:fillRef idx="1">
-        <a:scrgbClr r="0" g="0" b="0"/>
-      </a:fillRef>
-      <a:effectRef idx="0">
-        <a:scrgbClr r="0" g="0" b="0"/>
-      </a:effectRef>
-      <a:fontRef idx="minor"/>
-    </dgm:style>
-  </dgm:styleLbl>
-  <dgm:styleLbl name="fgAcc0">
-    <dgm:scene3d>
-      <a:camera prst="orthographicFront"/>
-      <a:lightRig rig="threePt" dir="t"/>
-    </dgm:scene3d>
-    <dgm:sp3d/>
-    <dgm:txPr/>
-    <dgm:style>
-      <a:lnRef idx="1">
-        <a:scrgbClr r="0" g="0" b="0"/>
-      </a:lnRef>
-      <a:fillRef idx="1">
-        <a:scrgbClr r="0" g="0" b="0"/>
-      </a:fillRef>
-      <a:effectRef idx="0">
-        <a:scrgbClr r="0" g="0" b="0"/>
-      </a:effectRef>
-      <a:fontRef idx="minor"/>
-    </dgm:style>
-  </dgm:styleLbl>
-  <dgm:styleLbl name="fgAcc2">
-    <dgm:scene3d>
-      <a:camera prst="orthographicFront"/>
-      <a:lightRig rig="threePt" dir="t"/>
-    </dgm:scene3d>
-    <dgm:sp3d/>
-    <dgm:txPr/>
-    <dgm:style>
-      <a:lnRef idx="1">
-        <a:scrgbClr r="0" g="0" b="0"/>
-      </a:lnRef>
-      <a:fillRef idx="1">
-        <a:scrgbClr r="0" g="0" b="0"/>
-      </a:fillRef>
-      <a:effectRef idx="0">
-        <a:scrgbClr r="0" g="0" b="0"/>
-      </a:effectRef>
-      <a:fontRef idx="minor"/>
-    </dgm:style>
-  </dgm:styleLbl>
-  <dgm:styleLbl name="fgAcc3">
-    <dgm:scene3d>
-      <a:camera prst="orthographicFront"/>
-      <a:lightRig rig="threePt" dir="t"/>
-    </dgm:scene3d>
-    <dgm:sp3d/>
-    <dgm:txPr/>
-    <dgm:style>
-      <a:lnRef idx="1">
-        <a:scrgbClr r="0" g="0" b="0"/>
-      </a:lnRef>
-      <a:fillRef idx="1">
-        <a:scrgbClr r="0" g="0" b="0"/>
-      </a:fillRef>
-      <a:effectRef idx="0">
-        <a:scrgbClr r="0" g="0" b="0"/>
-      </a:effectRef>
-      <a:fontRef idx="minor"/>
-    </dgm:style>
-  </dgm:styleLbl>
-  <dgm:styleLbl name="fgAcc4">
-    <dgm:scene3d>
-      <a:camera prst="orthographicFront"/>
-      <a:lightRig rig="threePt" dir="t"/>
-    </dgm:scene3d>
-    <dgm:sp3d/>
-    <dgm:txPr/>
-    <dgm:style>
-      <a:lnRef idx="1">
-        <a:scrgbClr r="0" g="0" b="0"/>
-      </a:lnRef>
-      <a:fillRef idx="1">
-        <a:scrgbClr r="0" g="0" b="0"/>
-      </a:fillRef>
-      <a:effectRef idx="0">
-        <a:scrgbClr r="0" g="0" b="0"/>
-      </a:effectRef>
-      <a:fontRef idx="minor"/>
-    </dgm:style>
-  </dgm:styleLbl>
-  <dgm:styleLbl name="bgShp">
-    <dgm:scene3d>
-      <a:camera prst="orthographicFront"/>
-      <a:lightRig rig="threePt" dir="t"/>
-    </dgm:scene3d>
-    <dgm:sp3d/>
-    <dgm:txPr/>
-    <dgm:style>
-      <a:lnRef idx="0">
-        <a:scrgbClr r="0" g="0" b="0"/>
-      </a:lnRef>
-      <a:fillRef idx="1">
-        <a:scrgbClr r="0" g="0" b="0"/>
-      </a:fillRef>
-      <a:effectRef idx="2">
-        <a:scrgbClr r="0" g="0" b="0"/>
-      </a:effectRef>
-      <a:fontRef idx="minor"/>
-    </dgm:style>
-  </dgm:styleLbl>
-  <dgm:styleLbl name="dkBgShp">
-    <dgm:scene3d>
-      <a:camera prst="orthographicFront"/>
-      <a:lightRig rig="threePt" dir="t"/>
-    </dgm:scene3d>
-    <dgm:sp3d/>
-    <dgm:txPr/>
-    <dgm:style>
-      <a:lnRef idx="0">
-        <a:scrgbClr r="0" g="0" b="0"/>
-      </a:lnRef>
-      <a:fillRef idx="1">
-        <a:scrgbClr r="0" g="0" b="0"/>
-      </a:fillRef>
-      <a:effectRef idx="2">
         <a:scrgbClr r="0" g="0" b="0"/>
       </a:effectRef>
       <a:fontRef idx="minor"/>
@@ -2545,7 +2516,6 @@
       <a:camera prst="orthographicFront"/>
       <a:lightRig rig="threePt" dir="t"/>
     </dgm:scene3d>
-    <dgm:sp3d/>
     <dgm:txPr/>
     <dgm:style>
       <a:lnRef idx="0">
@@ -2560,12 +2530,11 @@
       <a:fontRef idx="minor"/>
     </dgm:style>
   </dgm:styleLbl>
-  <dgm:styleLbl name="fgShp">
+  <dgm:styleLbl name="vennNode1">
     <dgm:scene3d>
       <a:camera prst="orthographicFront"/>
       <a:lightRig rig="threePt" dir="t"/>
     </dgm:scene3d>
-    <dgm:sp3d/>
     <dgm:txPr/>
     <dgm:style>
       <a:lnRef idx="0">
@@ -2574,30 +2543,12 @@
       <a:fillRef idx="3">
         <a:scrgbClr r="0" g="0" b="0"/>
       </a:fillRef>
-      <a:effectRef idx="2">
+      <a:effectRef idx="0">
         <a:scrgbClr r="0" g="0" b="0"/>
       </a:effectRef>
-      <a:fontRef idx="minor"/>
-    </dgm:style>
-  </dgm:styleLbl>
-  <dgm:styleLbl name="revTx">
-    <dgm:scene3d>
-      <a:camera prst="orthographicFront"/>
-      <a:lightRig rig="threePt" dir="t"/>
-    </dgm:scene3d>
-    <dgm:sp3d/>
-    <dgm:txPr/>
-    <dgm:style>
-      <a:lnRef idx="0">
-        <a:scrgbClr r="0" g="0" b="0"/>
-      </a:lnRef>
-      <a:fillRef idx="0">
-        <a:scrgbClr r="0" g="0" b="0"/>
-      </a:fillRef>
-      <a:effectRef idx="0">
-        <a:scrgbClr r="0" g="0" b="0"/>
-      </a:effectRef>
-      <a:fontRef idx="minor"/>
+      <a:fontRef idx="minor">
+        <a:schemeClr val="tx1"/>
+      </a:fontRef>
     </dgm:style>
   </dgm:styleLbl>
 </dgm:styleDef>
@@ -2685,7 +2636,6 @@
           <a:p>
             <a:fld id="{4F8253C2-C724-487B-AE05-10AF50D9BC39}" type="datetimeFigureOut">
               <a:rPr lang="en-US" smtClean="0"/>
-              <a:t>11/6/2018</a:t>
             </a:fld>
             <a:endParaRPr lang="en-US"/>
           </a:p>
@@ -2752,6 +2702,7 @@
               <a:rPr lang="en-US" smtClean="0"/>
               <a:t>Click to edit Master text styles</a:t>
             </a:r>
+            <a:endParaRPr lang="en-US" smtClean="0"/>
           </a:p>
           <a:p>
             <a:pPr lvl="1"/>
@@ -2759,6 +2710,7 @@
               <a:rPr lang="en-US" smtClean="0"/>
               <a:t>Second level</a:t>
             </a:r>
+            <a:endParaRPr lang="en-US" smtClean="0"/>
           </a:p>
           <a:p>
             <a:pPr lvl="2"/>
@@ -2766,6 +2718,7 @@
               <a:rPr lang="en-US" smtClean="0"/>
               <a:t>Third level</a:t>
             </a:r>
+            <a:endParaRPr lang="en-US" smtClean="0"/>
           </a:p>
           <a:p>
             <a:pPr lvl="3"/>
@@ -2773,6 +2726,7 @@
               <a:rPr lang="en-US" smtClean="0"/>
               <a:t>Fourth level</a:t>
             </a:r>
+            <a:endParaRPr lang="en-US" smtClean="0"/>
           </a:p>
           <a:p>
             <a:pPr lvl="4"/>
@@ -2844,18 +2798,12 @@
           <a:p>
             <a:fld id="{8B2CA80D-F9AE-4970-8E96-63021A684A3E}" type="slidenum">
               <a:rPr lang="en-US" smtClean="0"/>
-              <a:t>‹#›</a:t>
             </a:fld>
             <a:endParaRPr lang="en-US"/>
           </a:p>
         </p:txBody>
       </p:sp>
     </p:spTree>
-    <p:extLst>
-      <p:ext uri="{BB962C8B-B14F-4D97-AF65-F5344CB8AC3E}">
-        <p14:creationId xmlns:p14="http://schemas.microsoft.com/office/powerpoint/2010/main" val="1131247690"/>
-      </p:ext>
-    </p:extLst>
   </p:cSld>
   <p:clrMap bg1="lt1" tx1="dk1" bg2="lt2" tx2="dk2" accent1="accent1" accent2="accent2" accent3="accent3" accent4="accent4" accent5="accent5" accent6="accent6" hlink="hlink" folHlink="folHlink"/>
   <p:notesStyle>
@@ -3018,18 +2966,12 @@
           <a:p>
             <a:fld id="{8B2CA80D-F9AE-4970-8E96-63021A684A3E}" type="slidenum">
               <a:rPr lang="en-US" smtClean="0"/>
-              <a:t>4</a:t>
             </a:fld>
             <a:endParaRPr lang="en-US"/>
           </a:p>
         </p:txBody>
       </p:sp>
     </p:spTree>
-    <p:extLst>
-      <p:ext uri="{BB962C8B-B14F-4D97-AF65-F5344CB8AC3E}">
-        <p14:creationId xmlns:p14="http://schemas.microsoft.com/office/powerpoint/2010/main" val="3185446256"/>
-      </p:ext>
-    </p:extLst>
   </p:cSld>
   <p:clrMapOvr>
     <a:masterClrMapping/>
@@ -3218,7 +3160,6 @@
           <a:p>
             <a:fld id="{1A0412E9-256A-401F-89A5-3F78F58B3333}" type="datetimeFigureOut">
               <a:rPr lang="en-US" smtClean="0"/>
-              <a:t>11/6/2018</a:t>
             </a:fld>
             <a:endParaRPr lang="en-US"/>
           </a:p>
@@ -3260,18 +3201,12 @@
           <a:p>
             <a:fld id="{03CEF846-0B6A-41AC-9EC1-97B3EC969A6B}" type="slidenum">
               <a:rPr lang="en-US" smtClean="0"/>
-              <a:t>‹#›</a:t>
             </a:fld>
             <a:endParaRPr lang="en-US"/>
           </a:p>
         </p:txBody>
       </p:sp>
     </p:spTree>
-    <p:extLst>
-      <p:ext uri="{BB962C8B-B14F-4D97-AF65-F5344CB8AC3E}">
-        <p14:creationId xmlns:p14="http://schemas.microsoft.com/office/powerpoint/2010/main" val="551587373"/>
-      </p:ext>
-    </p:extLst>
   </p:cSld>
   <p:clrMapOvr>
     <a:masterClrMapping/>
@@ -3339,6 +3274,7 @@
               <a:rPr lang="en-US" smtClean="0"/>
               <a:t>Click to edit Master text styles</a:t>
             </a:r>
+            <a:endParaRPr lang="en-US" smtClean="0"/>
           </a:p>
           <a:p>
             <a:pPr lvl="1"/>
@@ -3346,6 +3282,7 @@
               <a:rPr lang="en-US" smtClean="0"/>
               <a:t>Second level</a:t>
             </a:r>
+            <a:endParaRPr lang="en-US" smtClean="0"/>
           </a:p>
           <a:p>
             <a:pPr lvl="2"/>
@@ -3353,6 +3290,7 @@
               <a:rPr lang="en-US" smtClean="0"/>
               <a:t>Third level</a:t>
             </a:r>
+            <a:endParaRPr lang="en-US" smtClean="0"/>
           </a:p>
           <a:p>
             <a:pPr lvl="3"/>
@@ -3360,6 +3298,7 @@
               <a:rPr lang="en-US" smtClean="0"/>
               <a:t>Fourth level</a:t>
             </a:r>
+            <a:endParaRPr lang="en-US" smtClean="0"/>
           </a:p>
           <a:p>
             <a:pPr lvl="4"/>
@@ -3388,7 +3327,6 @@
           <a:p>
             <a:fld id="{1A0412E9-256A-401F-89A5-3F78F58B3333}" type="datetimeFigureOut">
               <a:rPr lang="en-US" smtClean="0"/>
-              <a:t>11/6/2018</a:t>
             </a:fld>
             <a:endParaRPr lang="en-US"/>
           </a:p>
@@ -3430,18 +3368,12 @@
           <a:p>
             <a:fld id="{03CEF846-0B6A-41AC-9EC1-97B3EC969A6B}" type="slidenum">
               <a:rPr lang="en-US" smtClean="0"/>
-              <a:t>‹#›</a:t>
             </a:fld>
             <a:endParaRPr lang="en-US"/>
           </a:p>
         </p:txBody>
       </p:sp>
     </p:spTree>
-    <p:extLst>
-      <p:ext uri="{BB962C8B-B14F-4D97-AF65-F5344CB8AC3E}">
-        <p14:creationId xmlns:p14="http://schemas.microsoft.com/office/powerpoint/2010/main" val="2511849167"/>
-      </p:ext>
-    </p:extLst>
   </p:cSld>
   <p:clrMapOvr>
     <a:masterClrMapping/>
@@ -3519,6 +3451,7 @@
               <a:rPr lang="en-US" smtClean="0"/>
               <a:t>Click to edit Master text styles</a:t>
             </a:r>
+            <a:endParaRPr lang="en-US" smtClean="0"/>
           </a:p>
           <a:p>
             <a:pPr lvl="1"/>
@@ -3526,6 +3459,7 @@
               <a:rPr lang="en-US" smtClean="0"/>
               <a:t>Second level</a:t>
             </a:r>
+            <a:endParaRPr lang="en-US" smtClean="0"/>
           </a:p>
           <a:p>
             <a:pPr lvl="2"/>
@@ -3533,6 +3467,7 @@
               <a:rPr lang="en-US" smtClean="0"/>
               <a:t>Third level</a:t>
             </a:r>
+            <a:endParaRPr lang="en-US" smtClean="0"/>
           </a:p>
           <a:p>
             <a:pPr lvl="3"/>
@@ -3540,6 +3475,7 @@
               <a:rPr lang="en-US" smtClean="0"/>
               <a:t>Fourth level</a:t>
             </a:r>
+            <a:endParaRPr lang="en-US" smtClean="0"/>
           </a:p>
           <a:p>
             <a:pPr lvl="4"/>
@@ -3568,7 +3504,6 @@
           <a:p>
             <a:fld id="{1A0412E9-256A-401F-89A5-3F78F58B3333}" type="datetimeFigureOut">
               <a:rPr lang="en-US" smtClean="0"/>
-              <a:t>11/6/2018</a:t>
             </a:fld>
             <a:endParaRPr lang="en-US"/>
           </a:p>
@@ -3610,18 +3545,12 @@
           <a:p>
             <a:fld id="{03CEF846-0B6A-41AC-9EC1-97B3EC969A6B}" type="slidenum">
               <a:rPr lang="en-US" smtClean="0"/>
-              <a:t>‹#›</a:t>
             </a:fld>
             <a:endParaRPr lang="en-US"/>
           </a:p>
         </p:txBody>
       </p:sp>
     </p:spTree>
-    <p:extLst>
-      <p:ext uri="{BB962C8B-B14F-4D97-AF65-F5344CB8AC3E}">
-        <p14:creationId xmlns:p14="http://schemas.microsoft.com/office/powerpoint/2010/main" val="2497434313"/>
-      </p:ext>
-    </p:extLst>
   </p:cSld>
   <p:clrMapOvr>
     <a:masterClrMapping/>
@@ -3689,6 +3618,7 @@
               <a:rPr lang="en-US" smtClean="0"/>
               <a:t>Click to edit Master text styles</a:t>
             </a:r>
+            <a:endParaRPr lang="en-US" smtClean="0"/>
           </a:p>
           <a:p>
             <a:pPr lvl="1"/>
@@ -3696,6 +3626,7 @@
               <a:rPr lang="en-US" smtClean="0"/>
               <a:t>Second level</a:t>
             </a:r>
+            <a:endParaRPr lang="en-US" smtClean="0"/>
           </a:p>
           <a:p>
             <a:pPr lvl="2"/>
@@ -3703,6 +3634,7 @@
               <a:rPr lang="en-US" smtClean="0"/>
               <a:t>Third level</a:t>
             </a:r>
+            <a:endParaRPr lang="en-US" smtClean="0"/>
           </a:p>
           <a:p>
             <a:pPr lvl="3"/>
@@ -3710,6 +3642,7 @@
               <a:rPr lang="en-US" smtClean="0"/>
               <a:t>Fourth level</a:t>
             </a:r>
+            <a:endParaRPr lang="en-US" smtClean="0"/>
           </a:p>
           <a:p>
             <a:pPr lvl="4"/>
@@ -3738,7 +3671,6 @@
           <a:p>
             <a:fld id="{1A0412E9-256A-401F-89A5-3F78F58B3333}" type="datetimeFigureOut">
               <a:rPr lang="en-US" smtClean="0"/>
-              <a:t>11/6/2018</a:t>
             </a:fld>
             <a:endParaRPr lang="en-US"/>
           </a:p>
@@ -3780,18 +3712,12 @@
           <a:p>
             <a:fld id="{03CEF846-0B6A-41AC-9EC1-97B3EC969A6B}" type="slidenum">
               <a:rPr lang="en-US" smtClean="0"/>
-              <a:t>‹#›</a:t>
             </a:fld>
             <a:endParaRPr lang="en-US"/>
           </a:p>
         </p:txBody>
       </p:sp>
     </p:spTree>
-    <p:extLst>
-      <p:ext uri="{BB962C8B-B14F-4D97-AF65-F5344CB8AC3E}">
-        <p14:creationId xmlns:p14="http://schemas.microsoft.com/office/powerpoint/2010/main" val="27726060"/>
-      </p:ext>
-    </p:extLst>
   </p:cSld>
   <p:clrMapOvr>
     <a:masterClrMapping/>
@@ -3964,6 +3890,7 @@
               <a:rPr lang="en-US" smtClean="0"/>
               <a:t>Click to edit Master text styles</a:t>
             </a:r>
+            <a:endParaRPr lang="en-US" smtClean="0"/>
           </a:p>
         </p:txBody>
       </p:sp>
@@ -3984,7 +3911,6 @@
           <a:p>
             <a:fld id="{1A0412E9-256A-401F-89A5-3F78F58B3333}" type="datetimeFigureOut">
               <a:rPr lang="en-US" smtClean="0"/>
-              <a:t>11/6/2018</a:t>
             </a:fld>
             <a:endParaRPr lang="en-US"/>
           </a:p>
@@ -4026,18 +3952,12 @@
           <a:p>
             <a:fld id="{03CEF846-0B6A-41AC-9EC1-97B3EC969A6B}" type="slidenum">
               <a:rPr lang="en-US" smtClean="0"/>
-              <a:t>‹#›</a:t>
             </a:fld>
             <a:endParaRPr lang="en-US"/>
           </a:p>
         </p:txBody>
       </p:sp>
     </p:spTree>
-    <p:extLst>
-      <p:ext uri="{BB962C8B-B14F-4D97-AF65-F5344CB8AC3E}">
-        <p14:creationId xmlns:p14="http://schemas.microsoft.com/office/powerpoint/2010/main" val="3163274799"/>
-      </p:ext>
-    </p:extLst>
   </p:cSld>
   <p:clrMapOvr>
     <a:masterClrMapping/>
@@ -4138,6 +4058,7 @@
               <a:rPr lang="en-US" smtClean="0"/>
               <a:t>Click to edit Master text styles</a:t>
             </a:r>
+            <a:endParaRPr lang="en-US" smtClean="0"/>
           </a:p>
           <a:p>
             <a:pPr lvl="1"/>
@@ -4145,6 +4066,7 @@
               <a:rPr lang="en-US" smtClean="0"/>
               <a:t>Second level</a:t>
             </a:r>
+            <a:endParaRPr lang="en-US" smtClean="0"/>
           </a:p>
           <a:p>
             <a:pPr lvl="2"/>
@@ -4152,6 +4074,7 @@
               <a:rPr lang="en-US" smtClean="0"/>
               <a:t>Third level</a:t>
             </a:r>
+            <a:endParaRPr lang="en-US" smtClean="0"/>
           </a:p>
           <a:p>
             <a:pPr lvl="3"/>
@@ -4159,6 +4082,7 @@
               <a:rPr lang="en-US" smtClean="0"/>
               <a:t>Fourth level</a:t>
             </a:r>
+            <a:endParaRPr lang="en-US" smtClean="0"/>
           </a:p>
           <a:p>
             <a:pPr lvl="4"/>
@@ -4223,6 +4147,7 @@
               <a:rPr lang="en-US" smtClean="0"/>
               <a:t>Click to edit Master text styles</a:t>
             </a:r>
+            <a:endParaRPr lang="en-US" smtClean="0"/>
           </a:p>
           <a:p>
             <a:pPr lvl="1"/>
@@ -4230,6 +4155,7 @@
               <a:rPr lang="en-US" smtClean="0"/>
               <a:t>Second level</a:t>
             </a:r>
+            <a:endParaRPr lang="en-US" smtClean="0"/>
           </a:p>
           <a:p>
             <a:pPr lvl="2"/>
@@ -4237,6 +4163,7 @@
               <a:rPr lang="en-US" smtClean="0"/>
               <a:t>Third level</a:t>
             </a:r>
+            <a:endParaRPr lang="en-US" smtClean="0"/>
           </a:p>
           <a:p>
             <a:pPr lvl="3"/>
@@ -4244,6 +4171,7 @@
               <a:rPr lang="en-US" smtClean="0"/>
               <a:t>Fourth level</a:t>
             </a:r>
+            <a:endParaRPr lang="en-US" smtClean="0"/>
           </a:p>
           <a:p>
             <a:pPr lvl="4"/>
@@ -4272,7 +4200,6 @@
           <a:p>
             <a:fld id="{1A0412E9-256A-401F-89A5-3F78F58B3333}" type="datetimeFigureOut">
               <a:rPr lang="en-US" smtClean="0"/>
-              <a:t>11/6/2018</a:t>
             </a:fld>
             <a:endParaRPr lang="en-US"/>
           </a:p>
@@ -4314,18 +4241,12 @@
           <a:p>
             <a:fld id="{03CEF846-0B6A-41AC-9EC1-97B3EC969A6B}" type="slidenum">
               <a:rPr lang="en-US" smtClean="0"/>
-              <a:t>‹#›</a:t>
             </a:fld>
             <a:endParaRPr lang="en-US"/>
           </a:p>
         </p:txBody>
       </p:sp>
     </p:spTree>
-    <p:extLst>
-      <p:ext uri="{BB962C8B-B14F-4D97-AF65-F5344CB8AC3E}">
-        <p14:creationId xmlns:p14="http://schemas.microsoft.com/office/powerpoint/2010/main" val="1155116110"/>
-      </p:ext>
-    </p:extLst>
   </p:cSld>
   <p:clrMapOvr>
     <a:masterClrMapping/>
@@ -4439,6 +4360,7 @@
               <a:rPr lang="en-US" smtClean="0"/>
               <a:t>Click to edit Master text styles</a:t>
             </a:r>
+            <a:endParaRPr lang="en-US" smtClean="0"/>
           </a:p>
         </p:txBody>
       </p:sp>
@@ -4495,6 +4417,7 @@
               <a:rPr lang="en-US" smtClean="0"/>
               <a:t>Click to edit Master text styles</a:t>
             </a:r>
+            <a:endParaRPr lang="en-US" smtClean="0"/>
           </a:p>
           <a:p>
             <a:pPr lvl="1"/>
@@ -4502,6 +4425,7 @@
               <a:rPr lang="en-US" smtClean="0"/>
               <a:t>Second level</a:t>
             </a:r>
+            <a:endParaRPr lang="en-US" smtClean="0"/>
           </a:p>
           <a:p>
             <a:pPr lvl="2"/>
@@ -4509,6 +4433,7 @@
               <a:rPr lang="en-US" smtClean="0"/>
               <a:t>Third level</a:t>
             </a:r>
+            <a:endParaRPr lang="en-US" smtClean="0"/>
           </a:p>
           <a:p>
             <a:pPr lvl="3"/>
@@ -4516,6 +4441,7 @@
               <a:rPr lang="en-US" smtClean="0"/>
               <a:t>Fourth level</a:t>
             </a:r>
+            <a:endParaRPr lang="en-US" smtClean="0"/>
           </a:p>
           <a:p>
             <a:pPr lvl="4"/>
@@ -4589,6 +4515,7 @@
               <a:rPr lang="en-US" smtClean="0"/>
               <a:t>Click to edit Master text styles</a:t>
             </a:r>
+            <a:endParaRPr lang="en-US" smtClean="0"/>
           </a:p>
         </p:txBody>
       </p:sp>
@@ -4645,6 +4572,7 @@
               <a:rPr lang="en-US" smtClean="0"/>
               <a:t>Click to edit Master text styles</a:t>
             </a:r>
+            <a:endParaRPr lang="en-US" smtClean="0"/>
           </a:p>
           <a:p>
             <a:pPr lvl="1"/>
@@ -4652,6 +4580,7 @@
               <a:rPr lang="en-US" smtClean="0"/>
               <a:t>Second level</a:t>
             </a:r>
+            <a:endParaRPr lang="en-US" smtClean="0"/>
           </a:p>
           <a:p>
             <a:pPr lvl="2"/>
@@ -4659,6 +4588,7 @@
               <a:rPr lang="en-US" smtClean="0"/>
               <a:t>Third level</a:t>
             </a:r>
+            <a:endParaRPr lang="en-US" smtClean="0"/>
           </a:p>
           <a:p>
             <a:pPr lvl="3"/>
@@ -4666,6 +4596,7 @@
               <a:rPr lang="en-US" smtClean="0"/>
               <a:t>Fourth level</a:t>
             </a:r>
+            <a:endParaRPr lang="en-US" smtClean="0"/>
           </a:p>
           <a:p>
             <a:pPr lvl="4"/>
@@ -4694,7 +4625,6 @@
           <a:p>
             <a:fld id="{1A0412E9-256A-401F-89A5-3F78F58B3333}" type="datetimeFigureOut">
               <a:rPr lang="en-US" smtClean="0"/>
-              <a:t>11/6/2018</a:t>
             </a:fld>
             <a:endParaRPr lang="en-US"/>
           </a:p>
@@ -4736,18 +4666,12 @@
           <a:p>
             <a:fld id="{03CEF846-0B6A-41AC-9EC1-97B3EC969A6B}" type="slidenum">
               <a:rPr lang="en-US" smtClean="0"/>
-              <a:t>‹#›</a:t>
             </a:fld>
             <a:endParaRPr lang="en-US"/>
           </a:p>
         </p:txBody>
       </p:sp>
     </p:spTree>
-    <p:extLst>
-      <p:ext uri="{BB962C8B-B14F-4D97-AF65-F5344CB8AC3E}">
-        <p14:creationId xmlns:p14="http://schemas.microsoft.com/office/powerpoint/2010/main" val="1580490478"/>
-      </p:ext>
-    </p:extLst>
   </p:cSld>
   <p:clrMapOvr>
     <a:masterClrMapping/>
@@ -4812,7 +4736,6 @@
           <a:p>
             <a:fld id="{1A0412E9-256A-401F-89A5-3F78F58B3333}" type="datetimeFigureOut">
               <a:rPr lang="en-US" smtClean="0"/>
-              <a:t>11/6/2018</a:t>
             </a:fld>
             <a:endParaRPr lang="en-US"/>
           </a:p>
@@ -4854,18 +4777,12 @@
           <a:p>
             <a:fld id="{03CEF846-0B6A-41AC-9EC1-97B3EC969A6B}" type="slidenum">
               <a:rPr lang="en-US" smtClean="0"/>
-              <a:t>‹#›</a:t>
             </a:fld>
             <a:endParaRPr lang="en-US"/>
           </a:p>
         </p:txBody>
       </p:sp>
     </p:spTree>
-    <p:extLst>
-      <p:ext uri="{BB962C8B-B14F-4D97-AF65-F5344CB8AC3E}">
-        <p14:creationId xmlns:p14="http://schemas.microsoft.com/office/powerpoint/2010/main" val="2632259887"/>
-      </p:ext>
-    </p:extLst>
   </p:cSld>
   <p:clrMapOvr>
     <a:masterClrMapping/>
@@ -4907,7 +4824,6 @@
           <a:p>
             <a:fld id="{1A0412E9-256A-401F-89A5-3F78F58B3333}" type="datetimeFigureOut">
               <a:rPr lang="en-US" smtClean="0"/>
-              <a:t>11/6/2018</a:t>
             </a:fld>
             <a:endParaRPr lang="en-US"/>
           </a:p>
@@ -4949,18 +4865,12 @@
           <a:p>
             <a:fld id="{03CEF846-0B6A-41AC-9EC1-97B3EC969A6B}" type="slidenum">
               <a:rPr lang="en-US" smtClean="0"/>
-              <a:t>‹#›</a:t>
             </a:fld>
             <a:endParaRPr lang="en-US"/>
           </a:p>
         </p:txBody>
       </p:sp>
     </p:spTree>
-    <p:extLst>
-      <p:ext uri="{BB962C8B-B14F-4D97-AF65-F5344CB8AC3E}">
-        <p14:creationId xmlns:p14="http://schemas.microsoft.com/office/powerpoint/2010/main" val="3638626287"/>
-      </p:ext>
-    </p:extLst>
   </p:cSld>
   <p:clrMapOvr>
     <a:masterClrMapping/>
@@ -5070,6 +4980,7 @@
               <a:rPr lang="en-US" smtClean="0"/>
               <a:t>Click to edit Master text styles</a:t>
             </a:r>
+            <a:endParaRPr lang="en-US" smtClean="0"/>
           </a:p>
           <a:p>
             <a:pPr lvl="1"/>
@@ -5077,6 +4988,7 @@
               <a:rPr lang="en-US" smtClean="0"/>
               <a:t>Second level</a:t>
             </a:r>
+            <a:endParaRPr lang="en-US" smtClean="0"/>
           </a:p>
           <a:p>
             <a:pPr lvl="2"/>
@@ -5084,6 +4996,7 @@
               <a:rPr lang="en-US" smtClean="0"/>
               <a:t>Third level</a:t>
             </a:r>
+            <a:endParaRPr lang="en-US" smtClean="0"/>
           </a:p>
           <a:p>
             <a:pPr lvl="3"/>
@@ -5091,6 +5004,7 @@
               <a:rPr lang="en-US" smtClean="0"/>
               <a:t>Fourth level</a:t>
             </a:r>
+            <a:endParaRPr lang="en-US" smtClean="0"/>
           </a:p>
           <a:p>
             <a:pPr lvl="4"/>
@@ -5164,6 +5078,7 @@
               <a:rPr lang="en-US" smtClean="0"/>
               <a:t>Click to edit Master text styles</a:t>
             </a:r>
+            <a:endParaRPr lang="en-US" smtClean="0"/>
           </a:p>
         </p:txBody>
       </p:sp>
@@ -5184,7 +5099,6 @@
           <a:p>
             <a:fld id="{1A0412E9-256A-401F-89A5-3F78F58B3333}" type="datetimeFigureOut">
               <a:rPr lang="en-US" smtClean="0"/>
-              <a:t>11/6/2018</a:t>
             </a:fld>
             <a:endParaRPr lang="en-US"/>
           </a:p>
@@ -5226,18 +5140,12 @@
           <a:p>
             <a:fld id="{03CEF846-0B6A-41AC-9EC1-97B3EC969A6B}" type="slidenum">
               <a:rPr lang="en-US" smtClean="0"/>
-              <a:t>‹#›</a:t>
             </a:fld>
             <a:endParaRPr lang="en-US"/>
           </a:p>
         </p:txBody>
       </p:sp>
     </p:spTree>
-    <p:extLst>
-      <p:ext uri="{BB962C8B-B14F-4D97-AF65-F5344CB8AC3E}">
-        <p14:creationId xmlns:p14="http://schemas.microsoft.com/office/powerpoint/2010/main" val="3579896592"/>
-      </p:ext>
-    </p:extLst>
   </p:cSld>
   <p:clrMapOvr>
     <a:masterClrMapping/>
@@ -5417,6 +5325,7 @@
               <a:rPr lang="en-US" smtClean="0"/>
               <a:t>Click to edit Master text styles</a:t>
             </a:r>
+            <a:endParaRPr lang="en-US" smtClean="0"/>
           </a:p>
         </p:txBody>
       </p:sp>
@@ -5437,7 +5346,6 @@
           <a:p>
             <a:fld id="{1A0412E9-256A-401F-89A5-3F78F58B3333}" type="datetimeFigureOut">
               <a:rPr lang="en-US" smtClean="0"/>
-              <a:t>11/6/2018</a:t>
             </a:fld>
             <a:endParaRPr lang="en-US"/>
           </a:p>
@@ -5479,18 +5387,12 @@
           <a:p>
             <a:fld id="{03CEF846-0B6A-41AC-9EC1-97B3EC969A6B}" type="slidenum">
               <a:rPr lang="en-US" smtClean="0"/>
-              <a:t>‹#›</a:t>
             </a:fld>
             <a:endParaRPr lang="en-US"/>
           </a:p>
         </p:txBody>
       </p:sp>
     </p:spTree>
-    <p:extLst>
-      <p:ext uri="{BB962C8B-B14F-4D97-AF65-F5344CB8AC3E}">
-        <p14:creationId xmlns:p14="http://schemas.microsoft.com/office/powerpoint/2010/main" val="3219914279"/>
-      </p:ext>
-    </p:extLst>
   </p:cSld>
   <p:clrMapOvr>
     <a:masterClrMapping/>
@@ -5583,6 +5485,7 @@
               <a:rPr lang="en-US" smtClean="0"/>
               <a:t>Click to edit Master text styles</a:t>
             </a:r>
+            <a:endParaRPr lang="en-US" smtClean="0"/>
           </a:p>
           <a:p>
             <a:pPr lvl="1"/>
@@ -5590,6 +5493,7 @@
               <a:rPr lang="en-US" smtClean="0"/>
               <a:t>Second level</a:t>
             </a:r>
+            <a:endParaRPr lang="en-US" smtClean="0"/>
           </a:p>
           <a:p>
             <a:pPr lvl="2"/>
@@ -5597,6 +5501,7 @@
               <a:rPr lang="en-US" smtClean="0"/>
               <a:t>Third level</a:t>
             </a:r>
+            <a:endParaRPr lang="en-US" smtClean="0"/>
           </a:p>
           <a:p>
             <a:pPr lvl="3"/>
@@ -5604,6 +5509,7 @@
               <a:rPr lang="en-US" smtClean="0"/>
               <a:t>Fourth level</a:t>
             </a:r>
+            <a:endParaRPr lang="en-US" smtClean="0"/>
           </a:p>
           <a:p>
             <a:pPr lvl="4"/>
@@ -5650,7 +5556,6 @@
           <a:p>
             <a:fld id="{1A0412E9-256A-401F-89A5-3F78F58B3333}" type="datetimeFigureOut">
               <a:rPr lang="en-US" smtClean="0"/>
-              <a:t>11/6/2018</a:t>
             </a:fld>
             <a:endParaRPr lang="en-US"/>
           </a:p>
@@ -5728,18 +5633,12 @@
           <a:p>
             <a:fld id="{03CEF846-0B6A-41AC-9EC1-97B3EC969A6B}" type="slidenum">
               <a:rPr lang="en-US" smtClean="0"/>
-              <a:t>‹#›</a:t>
             </a:fld>
             <a:endParaRPr lang="en-US"/>
           </a:p>
         </p:txBody>
       </p:sp>
     </p:spTree>
-    <p:extLst>
-      <p:ext uri="{BB962C8B-B14F-4D97-AF65-F5344CB8AC3E}">
-        <p14:creationId xmlns:p14="http://schemas.microsoft.com/office/powerpoint/2010/main" val="1792420860"/>
-      </p:ext>
-    </p:extLst>
   </p:cSld>
   <p:clrMap bg1="lt1" tx1="dk1" bg2="lt2" tx2="dk2" accent1="accent1" accent2="accent2" accent3="accent3" accent4="accent4" accent5="accent5" accent6="accent6" hlink="hlink" folHlink="folHlink"/>
   <p:sldLayoutIdLst>
@@ -5777,7 +5676,7 @@
         <a:spcBef>
           <a:spcPct val="20000"/>
         </a:spcBef>
-        <a:buFont typeface="Arial" pitchFamily="34" charset="0"/>
+        <a:buFont typeface="Arial" panose="020B0604020202020204" pitchFamily="34" charset="0"/>
         <a:buChar char="•"/>
         <a:defRPr sz="3200" kern="1200">
           <a:solidFill>
@@ -5792,7 +5691,7 @@
         <a:spcBef>
           <a:spcPct val="20000"/>
         </a:spcBef>
-        <a:buFont typeface="Arial" pitchFamily="34" charset="0"/>
+        <a:buFont typeface="Arial" panose="020B0604020202020204" pitchFamily="34" charset="0"/>
         <a:buChar char="–"/>
         <a:defRPr sz="2800" kern="1200">
           <a:solidFill>
@@ -5807,7 +5706,7 @@
         <a:spcBef>
           <a:spcPct val="20000"/>
         </a:spcBef>
-        <a:buFont typeface="Arial" pitchFamily="34" charset="0"/>
+        <a:buFont typeface="Arial" panose="020B0604020202020204" pitchFamily="34" charset="0"/>
         <a:buChar char="•"/>
         <a:defRPr sz="2400" kern="1200">
           <a:solidFill>
@@ -5822,7 +5721,7 @@
         <a:spcBef>
           <a:spcPct val="20000"/>
         </a:spcBef>
-        <a:buFont typeface="Arial" pitchFamily="34" charset="0"/>
+        <a:buFont typeface="Arial" panose="020B0604020202020204" pitchFamily="34" charset="0"/>
         <a:buChar char="–"/>
         <a:defRPr sz="2000" kern="1200">
           <a:solidFill>
@@ -5837,7 +5736,7 @@
         <a:spcBef>
           <a:spcPct val="20000"/>
         </a:spcBef>
-        <a:buFont typeface="Arial" pitchFamily="34" charset="0"/>
+        <a:buFont typeface="Arial" panose="020B0604020202020204" pitchFamily="34" charset="0"/>
         <a:buChar char="»"/>
         <a:defRPr sz="2000" kern="1200">
           <a:solidFill>
@@ -5852,7 +5751,7 @@
         <a:spcBef>
           <a:spcPct val="20000"/>
         </a:spcBef>
-        <a:buFont typeface="Arial" pitchFamily="34" charset="0"/>
+        <a:buFont typeface="Arial" panose="020B0604020202020204" pitchFamily="34" charset="0"/>
         <a:buChar char="•"/>
         <a:defRPr sz="2000" kern="1200">
           <a:solidFill>
@@ -5867,7 +5766,7 @@
         <a:spcBef>
           <a:spcPct val="20000"/>
         </a:spcBef>
-        <a:buFont typeface="Arial" pitchFamily="34" charset="0"/>
+        <a:buFont typeface="Arial" panose="020B0604020202020204" pitchFamily="34" charset="0"/>
         <a:buChar char="•"/>
         <a:defRPr sz="2000" kern="1200">
           <a:solidFill>
@@ -5882,7 +5781,7 @@
         <a:spcBef>
           <a:spcPct val="20000"/>
         </a:spcBef>
-        <a:buFont typeface="Arial" pitchFamily="34" charset="0"/>
+        <a:buFont typeface="Arial" panose="020B0604020202020204" pitchFamily="34" charset="0"/>
         <a:buChar char="•"/>
         <a:defRPr sz="2000" kern="1200">
           <a:solidFill>
@@ -5897,7 +5796,7 @@
         <a:spcBef>
           <a:spcPct val="20000"/>
         </a:spcBef>
-        <a:buFont typeface="Arial" pitchFamily="34" charset="0"/>
+        <a:buFont typeface="Arial" panose="020B0604020202020204" pitchFamily="34" charset="0"/>
         <a:buChar char="•"/>
         <a:defRPr sz="2000" kern="1200">
           <a:solidFill>
@@ -6102,6 +6001,11 @@
               </a:rPr>
               <a:t> Islam</a:t>
             </a:r>
+            <a:endParaRPr lang="en-US" sz="2800" b="1" dirty="0" smtClean="0">
+              <a:solidFill>
+                <a:schemeClr val="tx1"/>
+              </a:solidFill>
+            </a:endParaRPr>
           </a:p>
           <a:p>
             <a:pPr algn="r"/>
@@ -6113,6 +6017,11 @@
               </a:rPr>
               <a:t>Professor</a:t>
             </a:r>
+            <a:endParaRPr lang="en-US" sz="2800" dirty="0" smtClean="0">
+              <a:solidFill>
+                <a:schemeClr val="tx1"/>
+              </a:solidFill>
+            </a:endParaRPr>
           </a:p>
           <a:p>
             <a:pPr algn="r"/>
@@ -6124,6 +6033,11 @@
               </a:rPr>
               <a:t>Computer Science &amp; Engineering (CSE)</a:t>
             </a:r>
+            <a:endParaRPr lang="en-US" sz="2800" dirty="0" smtClean="0">
+              <a:solidFill>
+                <a:schemeClr val="tx1"/>
+              </a:solidFill>
+            </a:endParaRPr>
           </a:p>
           <a:p>
             <a:pPr algn="r"/>
@@ -6135,6 +6049,11 @@
               </a:rPr>
               <a:t>United International University (UIU)</a:t>
             </a:r>
+            <a:endParaRPr lang="en-US" sz="2800" dirty="0" smtClean="0">
+              <a:solidFill>
+                <a:schemeClr val="tx1"/>
+              </a:solidFill>
+            </a:endParaRPr>
           </a:p>
           <a:p>
             <a:pPr algn="r"/>
@@ -6189,11 +6108,7 @@
           </a:extLst>
         </p:spPr>
         <p:txBody>
-          <a:bodyPr vert="horz" wrap="square" lIns="91440" tIns="45720" rIns="91440" bIns="45720" numCol="1" anchor="t" anchorCtr="0" compatLnSpc="1">
-            <a:prstTxWarp prst="textNoShape">
-              <a:avLst/>
-            </a:prstTxWarp>
-          </a:bodyPr>
+          <a:bodyPr vert="horz" wrap="square" lIns="91440" tIns="45720" rIns="91440" bIns="45720" numCol="1" anchor="t" anchorCtr="0" compatLnSpc="1"/>
           <a:lstStyle/>
           <a:p>
             <a:endParaRPr lang="en-US"/>
@@ -6228,11 +6143,7 @@
           </a:extLst>
         </p:spPr>
         <p:txBody>
-          <a:bodyPr vert="horz" wrap="square" lIns="91440" tIns="45720" rIns="91440" bIns="45720" numCol="1" anchor="t" anchorCtr="0" compatLnSpc="1">
-            <a:prstTxWarp prst="textNoShape">
-              <a:avLst/>
-            </a:prstTxWarp>
-          </a:bodyPr>
+          <a:bodyPr vert="horz" wrap="square" lIns="91440" tIns="45720" rIns="91440" bIns="45720" numCol="1" anchor="t" anchorCtr="0" compatLnSpc="1"/>
           <a:lstStyle/>
           <a:p>
             <a:endParaRPr lang="en-US"/>
@@ -6267,11 +6178,7 @@
           </a:extLst>
         </p:spPr>
         <p:txBody>
-          <a:bodyPr vert="horz" wrap="square" lIns="91440" tIns="45720" rIns="91440" bIns="45720" numCol="1" anchor="t" anchorCtr="0" compatLnSpc="1">
-            <a:prstTxWarp prst="textNoShape">
-              <a:avLst/>
-            </a:prstTxWarp>
-          </a:bodyPr>
+          <a:bodyPr vert="horz" wrap="square" lIns="91440" tIns="45720" rIns="91440" bIns="45720" numCol="1" anchor="t" anchorCtr="0" compatLnSpc="1"/>
           <a:lstStyle/>
           <a:p>
             <a:endParaRPr lang="en-US"/>
@@ -6287,7 +6194,7 @@
           <p:nvPr/>
         </p:nvPicPr>
         <p:blipFill>
-          <a:blip r:embed="rId2">
+          <a:blip r:embed="rId1">
             <a:extLst>
               <a:ext uri="{28A0092B-C50C-407E-A947-70E740481C1C}">
                 <a14:useLocalDpi xmlns:a14="http://schemas.microsoft.com/office/drawing/2010/main" val="0"/>
@@ -6343,11 +6250,6 @@
         </p:spPr>
       </p:pic>
     </p:spTree>
-    <p:extLst>
-      <p:ext uri="{BB962C8B-B14F-4D97-AF65-F5344CB8AC3E}">
-        <p14:creationId xmlns:p14="http://schemas.microsoft.com/office/powerpoint/2010/main" val="1321049027"/>
-      </p:ext>
-    </p:extLst>
   </p:cSld>
   <p:clrMapOvr>
     <a:masterClrMapping/>
@@ -6388,7 +6290,7 @@
           <p:nvPr/>
         </p:nvPicPr>
         <p:blipFill>
-          <a:blip r:embed="rId2"/>
+          <a:blip r:embed="rId1"/>
           <a:stretch>
             <a:fillRect/>
           </a:stretch>
@@ -6404,11 +6306,6 @@
         </p:spPr>
       </p:pic>
     </p:spTree>
-    <p:extLst>
-      <p:ext uri="{BB962C8B-B14F-4D97-AF65-F5344CB8AC3E}">
-        <p14:creationId xmlns:p14="http://schemas.microsoft.com/office/powerpoint/2010/main" val="1684300690"/>
-      </p:ext>
-    </p:extLst>
   </p:cSld>
   <p:clrMapOvr>
     <a:masterClrMapping/>
@@ -6450,8 +6347,6 @@
           <a:p>
             <a:fld id="{D5204F1F-25D6-4D42-9C24-75F3DD5E4724}" type="slidenum">
               <a:rPr lang="en-US"/>
-              <a:pPr/>
-              <a:t>11</a:t>
             </a:fld>
             <a:endParaRPr lang="en-US"/>
           </a:p>
@@ -6481,8 +6376,6 @@
               <a:srgbClr val="FF0066"/>
             </a:solidFill>
             <a:miter lim="800000"/>
-            <a:headEnd/>
-            <a:tailEnd/>
           </a:ln>
           <a:effectLst/>
           <a:extLst>
@@ -6520,7 +6413,7 @@
                     <a:srgbClr val="DDDDDD"/>
                   </a:outerShdw>
                 </a:effectLst>
-                <a:latin typeface="Times New Roman" charset="0"/>
+                <a:latin typeface="Times New Roman" panose="02020603050405020304" charset="0"/>
               </a:rPr>
               <a:t>Byte </a:t>
             </a:r>
@@ -6531,7 +6424,7 @@
                     <a:srgbClr val="DDDDDD"/>
                   </a:outerShdw>
                 </a:effectLst>
-                <a:latin typeface="Times New Roman" charset="0"/>
+                <a:latin typeface="Times New Roman" panose="02020603050405020304" charset="0"/>
               </a:rPr>
               <a:t>stuffing is the process of adding one extra </a:t>
             </a:r>
@@ -6542,7 +6435,7 @@
                     <a:srgbClr val="DDDDDD"/>
                   </a:outerShdw>
                 </a:effectLst>
-                <a:latin typeface="Times New Roman" charset="0"/>
+                <a:latin typeface="Times New Roman" panose="02020603050405020304" charset="0"/>
               </a:rPr>
               <a:t>byte </a:t>
             </a:r>
@@ -6553,7 +6446,7 @@
                     <a:srgbClr val="DDDDDD"/>
                   </a:outerShdw>
                 </a:effectLst>
-                <a:latin typeface="Times New Roman" charset="0"/>
+                <a:latin typeface="Times New Roman" panose="02020603050405020304" charset="0"/>
               </a:rPr>
               <a:t>whenever there </a:t>
             </a:r>
@@ -6564,7 +6457,7 @@
                     <a:srgbClr val="DDDDDD"/>
                   </a:outerShdw>
                 </a:effectLst>
-                <a:latin typeface="Times New Roman" charset="0"/>
+                <a:latin typeface="Times New Roman" panose="02020603050405020304" charset="0"/>
               </a:rPr>
               <a:t>is a flag or escape character in the text.</a:t>
             </a:r>
@@ -6574,7 +6467,7 @@
                   <a:srgbClr val="DDDDDD"/>
                 </a:outerShdw>
               </a:effectLst>
-              <a:latin typeface="Times New Roman" charset="0"/>
+              <a:latin typeface="Times New Roman" panose="02020603050405020304" charset="0"/>
             </a:endParaRPr>
           </a:p>
         </p:txBody>
@@ -6691,8 +6584,6 @@
               <a:srgbClr val="000000"/>
             </a:solidFill>
             <a:miter lim="800000"/>
-            <a:headEnd/>
-            <a:tailEnd/>
           </a:ln>
           <a:effectLst>
             <a:outerShdw blurRad="63500" dist="107763" dir="2700000" algn="ctr" rotWithShape="0">
@@ -6719,7 +6610,7 @@
           <p:nvPr/>
         </p:nvPicPr>
         <p:blipFill>
-          <a:blip r:embed="rId2" cstate="print">
+          <a:blip r:embed="rId1" cstate="print">
             <a:extLst>
               <a:ext uri="{28A0092B-C50C-407E-A947-70E740481C1C}">
                 <a14:useLocalDpi xmlns:a14="http://schemas.microsoft.com/office/drawing/2010/main" val="0"/>
@@ -6842,7 +6733,7 @@
                     <a:srgbClr val="FFFFFF"/>
                   </a:outerShdw>
                 </a:effectLst>
-                <a:latin typeface="Times New Roman" charset="0"/>
+                <a:latin typeface="Times New Roman" panose="02020603050405020304" charset="0"/>
               </a:rPr>
               <a:t>Note</a:t>
             </a:r>
@@ -6853,19 +6744,22 @@
                     <a:srgbClr val="FFFFFF"/>
                   </a:outerShdw>
                 </a:effectLst>
-                <a:latin typeface="Times New Roman" charset="0"/>
+                <a:latin typeface="Times New Roman" panose="02020603050405020304" charset="0"/>
               </a:rPr>
               <a:t>:</a:t>
             </a:r>
+            <a:endParaRPr lang="en-US" sz="3600" b="0">
+              <a:effectLst>
+                <a:outerShdw blurRad="38100" dist="38100" dir="2700000" algn="tl">
+                  <a:srgbClr val="FFFFFF"/>
+                </a:outerShdw>
+              </a:effectLst>
+              <a:latin typeface="Times New Roman" panose="02020603050405020304" charset="0"/>
+            </a:endParaRPr>
           </a:p>
         </p:txBody>
       </p:sp>
     </p:spTree>
-    <p:extLst>
-      <p:ext uri="{BB962C8B-B14F-4D97-AF65-F5344CB8AC3E}">
-        <p14:creationId xmlns:p14="http://schemas.microsoft.com/office/powerpoint/2010/main" val="2786828226"/>
-      </p:ext>
-    </p:extLst>
   </p:cSld>
   <p:clrMapOvr>
     <a:masterClrMapping/>
@@ -6879,7 +6773,7 @@
               <p:cTn id="2" dur="indefinite" nodeType="mainSeq">
                 <p:childTnLst>
                   <p:par>
-                    <p:cTn id="3" fill="hold" nodeType="clickPar">
+                    <p:cTn id="3" fill="hold">
                       <p:stCondLst>
                         <p:cond delay="indefinite"/>
                         <p:cond evt="onBegin" delay="0">
@@ -6888,7 +6782,7 @@
                       </p:stCondLst>
                       <p:childTnLst>
                         <p:par>
-                          <p:cTn id="4" fill="hold" nodeType="withGroup">
+                          <p:cTn id="4" fill="hold">
                             <p:stCondLst>
                               <p:cond delay="0"/>
                             </p:stCondLst>
@@ -7058,196 +6952,6 @@
               </a:rPr>
               <a:t>frame</a:t>
             </a:r>
-          </a:p>
-          <a:p>
-            <a:r>
-              <a:rPr lang="en-US" dirty="0" smtClean="0">
-                <a:solidFill>
-                  <a:srgbClr val="FF0000"/>
-                </a:solidFill>
-              </a:rPr>
-              <a:t>Stuff </a:t>
-            </a:r>
-            <a:r>
-              <a:rPr lang="en-US" dirty="0">
-                <a:solidFill>
-                  <a:srgbClr val="FF0000"/>
-                </a:solidFill>
-              </a:rPr>
-              <a:t>1 single bit</a:t>
-            </a:r>
-            <a:r>
-              <a:rPr lang="en-US" dirty="0">
-                <a:solidFill>
-                  <a:srgbClr val="000000"/>
-                </a:solidFill>
-              </a:rPr>
-              <a:t> (instead of </a:t>
-            </a:r>
-            <a:r>
-              <a:rPr lang="en-US" dirty="0" smtClean="0">
-                <a:solidFill>
-                  <a:srgbClr val="000000"/>
-                </a:solidFill>
-              </a:rPr>
-              <a:t>1 </a:t>
-            </a:r>
-            <a:r>
-              <a:rPr lang="en-US" dirty="0">
-                <a:solidFill>
-                  <a:srgbClr val="000000"/>
-                </a:solidFill>
-              </a:rPr>
-              <a:t>byte) to prevent the pattern from looking like a </a:t>
-            </a:r>
-            <a:r>
-              <a:rPr lang="en-US" dirty="0" smtClean="0">
-                <a:solidFill>
-                  <a:srgbClr val="000000"/>
-                </a:solidFill>
-              </a:rPr>
-              <a:t>flag (The </a:t>
-            </a:r>
-            <a:r>
-              <a:rPr lang="en-US" dirty="0">
-                <a:solidFill>
-                  <a:srgbClr val="000000"/>
-                </a:solidFill>
-              </a:rPr>
-              <a:t>strategy is called bit </a:t>
-            </a:r>
-            <a:r>
-              <a:rPr lang="en-US" dirty="0" smtClean="0">
-                <a:solidFill>
-                  <a:srgbClr val="000000"/>
-                </a:solidFill>
-              </a:rPr>
-              <a:t>stuffing). </a:t>
-            </a:r>
-          </a:p>
-          <a:p>
-            <a:r>
-              <a:rPr lang="en-US" dirty="0" smtClean="0">
-                <a:solidFill>
-                  <a:srgbClr val="000000"/>
-                </a:solidFill>
-              </a:rPr>
-              <a:t>If </a:t>
-            </a:r>
-            <a:r>
-              <a:rPr lang="en-US" dirty="0">
-                <a:solidFill>
-                  <a:srgbClr val="000000"/>
-                </a:solidFill>
-              </a:rPr>
-              <a:t>a 0 and </a:t>
-            </a:r>
-            <a:r>
-              <a:rPr lang="en-US" dirty="0" smtClean="0">
-                <a:solidFill>
-                  <a:srgbClr val="000000"/>
-                </a:solidFill>
-              </a:rPr>
-              <a:t>five (05) </a:t>
-            </a:r>
-            <a:r>
-              <a:rPr lang="en-US" dirty="0">
-                <a:solidFill>
-                  <a:srgbClr val="000000"/>
-                </a:solidFill>
-              </a:rPr>
-              <a:t>consecutive </a:t>
-            </a:r>
-            <a:r>
-              <a:rPr lang="en-US" dirty="0" smtClean="0">
-                <a:solidFill>
-                  <a:srgbClr val="000000"/>
-                </a:solidFill>
-              </a:rPr>
-              <a:t>1 (i.e. </a:t>
-            </a:r>
-            <a:r>
-              <a:rPr lang="en-US" dirty="0" smtClean="0">
-                <a:solidFill>
-                  <a:srgbClr val="FF0000"/>
-                </a:solidFill>
-              </a:rPr>
-              <a:t>011111</a:t>
-            </a:r>
-            <a:r>
-              <a:rPr lang="en-US" dirty="0" smtClean="0">
-                <a:solidFill>
-                  <a:srgbClr val="000000"/>
-                </a:solidFill>
-              </a:rPr>
-              <a:t>)bits </a:t>
-            </a:r>
-            <a:r>
-              <a:rPr lang="en-US" dirty="0">
-                <a:solidFill>
-                  <a:srgbClr val="000000"/>
-                </a:solidFill>
-              </a:rPr>
-              <a:t>are encountered, </a:t>
-            </a:r>
-            <a:r>
-              <a:rPr lang="en-US" dirty="0">
-                <a:solidFill>
-                  <a:srgbClr val="FF0000"/>
-                </a:solidFill>
-              </a:rPr>
-              <a:t>an extra 0 is </a:t>
-            </a:r>
-            <a:r>
-              <a:rPr lang="en-US" dirty="0" smtClean="0">
-                <a:solidFill>
-                  <a:srgbClr val="FF0000"/>
-                </a:solidFill>
-              </a:rPr>
-              <a:t>added, </a:t>
-            </a:r>
-            <a:r>
-              <a:rPr lang="en-US" dirty="0" smtClean="0">
-                <a:solidFill>
-                  <a:srgbClr val="000000"/>
-                </a:solidFill>
-              </a:rPr>
-              <a:t>regardless </a:t>
-            </a:r>
-            <a:r>
-              <a:rPr lang="en-US" dirty="0">
-                <a:solidFill>
-                  <a:srgbClr val="000000"/>
-                </a:solidFill>
-              </a:rPr>
-              <a:t>of the value of the next bit</a:t>
-            </a:r>
-            <a:r>
-              <a:rPr lang="en-US" dirty="0" smtClean="0">
-                <a:solidFill>
-                  <a:srgbClr val="000000"/>
-                </a:solidFill>
-              </a:rPr>
-              <a:t>. </a:t>
-            </a:r>
-          </a:p>
-          <a:p>
-            <a:r>
-              <a:rPr lang="en-US" dirty="0" smtClean="0">
-                <a:solidFill>
-                  <a:srgbClr val="000000"/>
-                </a:solidFill>
-              </a:rPr>
-              <a:t>This </a:t>
-            </a:r>
-            <a:r>
-              <a:rPr lang="en-US" dirty="0">
-                <a:solidFill>
-                  <a:srgbClr val="000000"/>
-                </a:solidFill>
-              </a:rPr>
-              <a:t>extra stuffed bit is eventually removed from the data by the receiver. </a:t>
-            </a:r>
             <a:endParaRPr lang="en-US" dirty="0" smtClean="0">
               <a:solidFill>
                 <a:srgbClr val="000000"/>
@@ -7258,9 +6962,191 @@
             <a:r>
               <a:rPr lang="en-US" dirty="0" smtClean="0">
                 <a:solidFill>
+                  <a:srgbClr val="FF0000"/>
+                </a:solidFill>
+              </a:rPr>
+              <a:t>Stuff </a:t>
+            </a:r>
+            <a:r>
+              <a:rPr lang="en-US" dirty="0">
+                <a:solidFill>
+                  <a:srgbClr val="FF0000"/>
+                </a:solidFill>
+              </a:rPr>
+              <a:t>1 single bit</a:t>
+            </a:r>
+            <a:r>
+              <a:rPr lang="en-US" dirty="0">
+                <a:solidFill>
                   <a:srgbClr val="000000"/>
                 </a:solidFill>
               </a:rPr>
+              <a:t> (instead of </a:t>
+            </a:r>
+            <a:r>
+              <a:rPr lang="en-US" dirty="0" smtClean="0">
+                <a:solidFill>
+                  <a:srgbClr val="000000"/>
+                </a:solidFill>
+              </a:rPr>
+              <a:t>1 </a:t>
+            </a:r>
+            <a:r>
+              <a:rPr lang="en-US" dirty="0">
+                <a:solidFill>
+                  <a:srgbClr val="000000"/>
+                </a:solidFill>
+              </a:rPr>
+              <a:t>byte) to prevent the pattern from looking like a </a:t>
+            </a:r>
+            <a:r>
+              <a:rPr lang="en-US" dirty="0" smtClean="0">
+                <a:solidFill>
+                  <a:srgbClr val="000000"/>
+                </a:solidFill>
+              </a:rPr>
+              <a:t>flag (The </a:t>
+            </a:r>
+            <a:r>
+              <a:rPr lang="en-US" dirty="0">
+                <a:solidFill>
+                  <a:srgbClr val="000000"/>
+                </a:solidFill>
+              </a:rPr>
+              <a:t>strategy is called bit </a:t>
+            </a:r>
+            <a:r>
+              <a:rPr lang="en-US" dirty="0" smtClean="0">
+                <a:solidFill>
+                  <a:srgbClr val="000000"/>
+                </a:solidFill>
+              </a:rPr>
+              <a:t>stuffing). </a:t>
+            </a:r>
+            <a:endParaRPr lang="en-US" dirty="0" smtClean="0">
+              <a:solidFill>
+                <a:srgbClr val="000000"/>
+              </a:solidFill>
+            </a:endParaRPr>
+          </a:p>
+          <a:p>
+            <a:r>
+              <a:rPr lang="en-US" dirty="0" smtClean="0">
+                <a:solidFill>
+                  <a:srgbClr val="000000"/>
+                </a:solidFill>
+              </a:rPr>
+              <a:t>If </a:t>
+            </a:r>
+            <a:r>
+              <a:rPr lang="en-US" dirty="0">
+                <a:solidFill>
+                  <a:srgbClr val="000000"/>
+                </a:solidFill>
+              </a:rPr>
+              <a:t>a 0 and </a:t>
+            </a:r>
+            <a:r>
+              <a:rPr lang="en-US" dirty="0" smtClean="0">
+                <a:solidFill>
+                  <a:srgbClr val="000000"/>
+                </a:solidFill>
+              </a:rPr>
+              <a:t>five (05) </a:t>
+            </a:r>
+            <a:r>
+              <a:rPr lang="en-US" dirty="0">
+                <a:solidFill>
+                  <a:srgbClr val="000000"/>
+                </a:solidFill>
+              </a:rPr>
+              <a:t>consecutive </a:t>
+            </a:r>
+            <a:r>
+              <a:rPr lang="en-US" dirty="0" smtClean="0">
+                <a:solidFill>
+                  <a:srgbClr val="000000"/>
+                </a:solidFill>
+              </a:rPr>
+              <a:t>1 (i.e. </a:t>
+            </a:r>
+            <a:r>
+              <a:rPr lang="en-US" dirty="0" smtClean="0">
+                <a:solidFill>
+                  <a:srgbClr val="FF0000"/>
+                </a:solidFill>
+              </a:rPr>
+              <a:t>011111</a:t>
+            </a:r>
+            <a:r>
+              <a:rPr lang="en-US" dirty="0" smtClean="0">
+                <a:solidFill>
+                  <a:srgbClr val="000000"/>
+                </a:solidFill>
+              </a:rPr>
+              <a:t>)bits </a:t>
+            </a:r>
+            <a:r>
+              <a:rPr lang="en-US" dirty="0">
+                <a:solidFill>
+                  <a:srgbClr val="000000"/>
+                </a:solidFill>
+              </a:rPr>
+              <a:t>are encountered, </a:t>
+            </a:r>
+            <a:r>
+              <a:rPr lang="en-US" dirty="0">
+                <a:solidFill>
+                  <a:srgbClr val="FF0000"/>
+                </a:solidFill>
+              </a:rPr>
+              <a:t>an extra 0 is </a:t>
+            </a:r>
+            <a:r>
+              <a:rPr lang="en-US" dirty="0" smtClean="0">
+                <a:solidFill>
+                  <a:srgbClr val="FF0000"/>
+                </a:solidFill>
+              </a:rPr>
+              <a:t>added, </a:t>
+            </a:r>
+            <a:r>
+              <a:rPr lang="en-US" dirty="0" smtClean="0">
+                <a:solidFill>
+                  <a:srgbClr val="000000"/>
+                </a:solidFill>
+              </a:rPr>
+              <a:t>regardless </a:t>
+            </a:r>
+            <a:r>
+              <a:rPr lang="en-US" dirty="0">
+                <a:solidFill>
+                  <a:srgbClr val="000000"/>
+                </a:solidFill>
+              </a:rPr>
+              <a:t>of the value of the next bit</a:t>
+            </a:r>
+            <a:r>
+              <a:rPr lang="en-US" dirty="0" smtClean="0">
+                <a:solidFill>
+                  <a:srgbClr val="000000"/>
+                </a:solidFill>
+              </a:rPr>
+              <a:t>. </a:t>
+            </a:r>
+            <a:endParaRPr lang="en-US" dirty="0" smtClean="0">
+              <a:solidFill>
+                <a:srgbClr val="000000"/>
+              </a:solidFill>
+            </a:endParaRPr>
+          </a:p>
+          <a:p>
+            <a:r>
+              <a:rPr lang="en-US" dirty="0" smtClean="0">
+                <a:solidFill>
+                  <a:srgbClr val="000000"/>
+                </a:solidFill>
+              </a:rPr>
               <a:t>This </a:t>
             </a:r>
             <a:r>
@@ -7269,6 +7155,29 @@
                   <a:srgbClr val="000000"/>
                 </a:solidFill>
               </a:rPr>
+              <a:t>extra stuffed bit is eventually removed from the data by the receiver. </a:t>
+            </a:r>
+            <a:endParaRPr lang="en-US" dirty="0" smtClean="0">
+              <a:solidFill>
+                <a:srgbClr val="000000"/>
+              </a:solidFill>
+            </a:endParaRPr>
+          </a:p>
+          <a:p>
+            <a:r>
+              <a:rPr lang="en-US" dirty="0" smtClean="0">
+                <a:solidFill>
+                  <a:srgbClr val="000000"/>
+                </a:solidFill>
+              </a:rPr>
+              <a:t>This </a:t>
+            </a:r>
+            <a:r>
+              <a:rPr lang="en-US" dirty="0">
+                <a:solidFill>
+                  <a:srgbClr val="000000"/>
+                </a:solidFill>
+              </a:rPr>
               <a:t>guarantees that the </a:t>
             </a:r>
             <a:r>
@@ -7303,15 +7212,15 @@
               </a:rPr>
               <a:t>.</a:t>
             </a:r>
+            <a:endParaRPr lang="en-US" dirty="0">
+              <a:solidFill>
+                <a:srgbClr val="000000"/>
+              </a:solidFill>
+            </a:endParaRPr>
           </a:p>
         </p:txBody>
       </p:sp>
     </p:spTree>
-    <p:extLst>
-      <p:ext uri="{BB962C8B-B14F-4D97-AF65-F5344CB8AC3E}">
-        <p14:creationId xmlns:p14="http://schemas.microsoft.com/office/powerpoint/2010/main" val="2804238991"/>
-      </p:ext>
-    </p:extLst>
   </p:cSld>
   <p:clrMapOvr>
     <a:masterClrMapping/>
@@ -7345,7 +7254,7 @@
           <p:nvPr/>
         </p:nvPicPr>
         <p:blipFill>
-          <a:blip r:embed="rId2"/>
+          <a:blip r:embed="rId1"/>
           <a:stretch>
             <a:fillRect/>
           </a:stretch>
@@ -7361,11 +7270,6 @@
         </p:spPr>
       </p:pic>
     </p:spTree>
-    <p:extLst>
-      <p:ext uri="{BB962C8B-B14F-4D97-AF65-F5344CB8AC3E}">
-        <p14:creationId xmlns:p14="http://schemas.microsoft.com/office/powerpoint/2010/main" val="2570056054"/>
-      </p:ext>
-    </p:extLst>
   </p:cSld>
   <p:clrMapOvr>
     <a:masterClrMapping/>
@@ -7407,8 +7311,6 @@
           <a:p>
             <a:fld id="{D5204F1F-25D6-4D42-9C24-75F3DD5E4724}" type="slidenum">
               <a:rPr lang="en-US"/>
-              <a:pPr/>
-              <a:t>14</a:t>
             </a:fld>
             <a:endParaRPr lang="en-US"/>
           </a:p>
@@ -7438,8 +7340,6 @@
               <a:srgbClr val="FF0066"/>
             </a:solidFill>
             <a:miter lim="800000"/>
-            <a:headEnd/>
-            <a:tailEnd/>
           </a:ln>
           <a:effectLst/>
           <a:extLst>
@@ -7477,7 +7377,7 @@
                     <a:srgbClr val="DDDDDD"/>
                   </a:outerShdw>
                 </a:effectLst>
-                <a:latin typeface="Times New Roman" charset="0"/>
+                <a:latin typeface="Times New Roman" panose="02020603050405020304" charset="0"/>
               </a:rPr>
               <a:t>Bit stuffing is the process of adding one extra 0 whenever there are </a:t>
             </a:r>
@@ -7488,7 +7388,7 @@
                     <a:srgbClr val="DDDDDD"/>
                   </a:outerShdw>
                 </a:effectLst>
-                <a:latin typeface="Times New Roman" charset="0"/>
+                <a:latin typeface="Times New Roman" panose="02020603050405020304" charset="0"/>
               </a:rPr>
               <a:t>5 </a:t>
             </a:r>
@@ -7499,7 +7399,7 @@
                     <a:srgbClr val="DDDDDD"/>
                   </a:outerShdw>
                 </a:effectLst>
-                <a:latin typeface="Times New Roman" charset="0"/>
+                <a:latin typeface="Times New Roman" panose="02020603050405020304" charset="0"/>
               </a:rPr>
               <a:t>consecutive 1s </a:t>
             </a:r>
@@ -7510,7 +7410,7 @@
                     <a:srgbClr val="DDDDDD"/>
                   </a:outerShdw>
                 </a:effectLst>
-                <a:latin typeface="Times New Roman" charset="0"/>
+                <a:latin typeface="Times New Roman" panose="02020603050405020304" charset="0"/>
               </a:rPr>
               <a:t>(i.e. 111110) in </a:t>
             </a:r>
@@ -7521,7 +7421,7 @@
                     <a:srgbClr val="DDDDDD"/>
                   </a:outerShdw>
                 </a:effectLst>
-                <a:latin typeface="Times New Roman" charset="0"/>
+                <a:latin typeface="Times New Roman" panose="02020603050405020304" charset="0"/>
               </a:rPr>
               <a:t>the data so that the receiver does not mistake the </a:t>
             </a:r>
@@ -7532,7 +7432,7 @@
                     <a:srgbClr val="DDDDDD"/>
                   </a:outerShdw>
                 </a:effectLst>
-                <a:latin typeface="Times New Roman" charset="0"/>
+                <a:latin typeface="Times New Roman" panose="02020603050405020304" charset="0"/>
               </a:rPr>
             </a:br>
             <a:r>
@@ -7542,7 +7442,7 @@
                     <a:srgbClr val="DDDDDD"/>
                   </a:outerShdw>
                 </a:effectLst>
-                <a:latin typeface="Times New Roman" charset="0"/>
+                <a:latin typeface="Times New Roman" panose="02020603050405020304" charset="0"/>
               </a:rPr>
               <a:t>data for a </a:t>
             </a:r>
@@ -7553,7 +7453,7 @@
                     <a:srgbClr val="DDDDDD"/>
                   </a:outerShdw>
                 </a:effectLst>
-                <a:latin typeface="Times New Roman" charset="0"/>
+                <a:latin typeface="Times New Roman" panose="02020603050405020304" charset="0"/>
               </a:rPr>
               <a:t>flag (01111110).</a:t>
             </a:r>
@@ -7563,7 +7463,7 @@
                   <a:srgbClr val="DDDDDD"/>
                 </a:outerShdw>
               </a:effectLst>
-              <a:latin typeface="Times New Roman" charset="0"/>
+              <a:latin typeface="Times New Roman" panose="02020603050405020304" charset="0"/>
             </a:endParaRPr>
           </a:p>
         </p:txBody>
@@ -7680,8 +7580,6 @@
               <a:srgbClr val="000000"/>
             </a:solidFill>
             <a:miter lim="800000"/>
-            <a:headEnd/>
-            <a:tailEnd/>
           </a:ln>
           <a:effectLst>
             <a:outerShdw blurRad="63500" dist="107763" dir="2700000" algn="ctr" rotWithShape="0">
@@ -7708,7 +7606,7 @@
           <p:nvPr/>
         </p:nvPicPr>
         <p:blipFill>
-          <a:blip r:embed="rId2" cstate="print">
+          <a:blip r:embed="rId1" cstate="print">
             <a:extLst>
               <a:ext uri="{28A0092B-C50C-407E-A947-70E740481C1C}">
                 <a14:useLocalDpi xmlns:a14="http://schemas.microsoft.com/office/drawing/2010/main" val="0"/>
@@ -7831,7 +7729,7 @@
                     <a:srgbClr val="FFFFFF"/>
                   </a:outerShdw>
                 </a:effectLst>
-                <a:latin typeface="Times New Roman" charset="0"/>
+                <a:latin typeface="Times New Roman" panose="02020603050405020304" charset="0"/>
               </a:rPr>
               <a:t>Note</a:t>
             </a:r>
@@ -7842,19 +7740,22 @@
                     <a:srgbClr val="FFFFFF"/>
                   </a:outerShdw>
                 </a:effectLst>
-                <a:latin typeface="Times New Roman" charset="0"/>
+                <a:latin typeface="Times New Roman" panose="02020603050405020304" charset="0"/>
               </a:rPr>
               <a:t>:</a:t>
             </a:r>
+            <a:endParaRPr lang="en-US" sz="3600" b="0">
+              <a:effectLst>
+                <a:outerShdw blurRad="38100" dist="38100" dir="2700000" algn="tl">
+                  <a:srgbClr val="FFFFFF"/>
+                </a:outerShdw>
+              </a:effectLst>
+              <a:latin typeface="Times New Roman" panose="02020603050405020304" charset="0"/>
+            </a:endParaRPr>
           </a:p>
         </p:txBody>
       </p:sp>
     </p:spTree>
-    <p:extLst>
-      <p:ext uri="{BB962C8B-B14F-4D97-AF65-F5344CB8AC3E}">
-        <p14:creationId xmlns:p14="http://schemas.microsoft.com/office/powerpoint/2010/main" val="3114607152"/>
-      </p:ext>
-    </p:extLst>
   </p:cSld>
   <p:clrMapOvr>
     <a:masterClrMapping/>
@@ -7868,7 +7769,7 @@
               <p:cTn id="2" dur="indefinite" nodeType="mainSeq">
                 <p:childTnLst>
                   <p:par>
-                    <p:cTn id="3" fill="hold" nodeType="clickPar">
+                    <p:cTn id="3" fill="hold">
                       <p:stCondLst>
                         <p:cond delay="indefinite"/>
                         <p:cond evt="onBegin" delay="0">
@@ -7877,7 +7778,7 @@
                       </p:stCondLst>
                       <p:childTnLst>
                         <p:par>
-                          <p:cTn id="4" fill="hold" nodeType="withGroup">
+                          <p:cTn id="4" fill="hold">
                             <p:stCondLst>
                               <p:cond delay="0"/>
                             </p:stCondLst>
@@ -7977,8 +7878,6 @@
           <a:p>
             <a:fld id="{611E8793-4F73-6848-B909-4F865C0B88B3}" type="slidenum">
               <a:rPr lang="en-US"/>
-              <a:pPr/>
-              <a:t>15</a:t>
             </a:fld>
             <a:endParaRPr lang="en-US"/>
           </a:p>
@@ -8113,7 +8012,7 @@
           <p:nvPr/>
         </p:nvPicPr>
         <p:blipFill>
-          <a:blip r:embed="rId2"/>
+          <a:blip r:embed="rId1"/>
           <a:stretch>
             <a:fillRect/>
           </a:stretch>
@@ -8129,11 +8028,6 @@
         </p:spPr>
       </p:pic>
     </p:spTree>
-    <p:extLst>
-      <p:ext uri="{BB962C8B-B14F-4D97-AF65-F5344CB8AC3E}">
-        <p14:creationId xmlns:p14="http://schemas.microsoft.com/office/powerpoint/2010/main" val="2148470749"/>
-      </p:ext>
-    </p:extLst>
   </p:cSld>
   <p:clrMapOvr>
     <a:masterClrMapping/>
@@ -8174,7 +8068,7 @@
           <p:nvPr/>
         </p:nvPicPr>
         <p:blipFill>
-          <a:blip r:embed="rId2"/>
+          <a:blip r:embed="rId1"/>
           <a:stretch>
             <a:fillRect/>
           </a:stretch>
@@ -8190,11 +8084,6 @@
         </p:spPr>
       </p:pic>
     </p:spTree>
-    <p:extLst>
-      <p:ext uri="{BB962C8B-B14F-4D97-AF65-F5344CB8AC3E}">
-        <p14:creationId xmlns:p14="http://schemas.microsoft.com/office/powerpoint/2010/main" val="1201719247"/>
-      </p:ext>
-    </p:extLst>
   </p:cSld>
   <p:clrMapOvr>
     <a:masterClrMapping/>
@@ -8252,20 +8141,27 @@
                     <a:srgbClr val="C0C0C0"/>
                   </a:outerShdw>
                 </a:effectLst>
-                <a:latin typeface="Blackadder ITC" pitchFamily="82" charset="0"/>
-                <a:ea typeface="ＭＳ Ｐゴシック" pitchFamily="34" charset="-128"/>
+                <a:latin typeface="Blackadder ITC" panose="04020505051007020D02" pitchFamily="82" charset="0"/>
+                <a:ea typeface="MS PGothic" panose="020B0600070205080204" charset="-128"/>
               </a:rPr>
               <a:t>Thank    You</a:t>
             </a:r>
+            <a:endParaRPr lang="en-US" sz="6000" dirty="0" smtClean="0">
+              <a:solidFill>
+                <a:schemeClr val="tx1"/>
+              </a:solidFill>
+              <a:effectLst>
+                <a:outerShdw blurRad="38100" dist="38100" dir="2700000" algn="tl">
+                  <a:srgbClr val="C0C0C0"/>
+                </a:outerShdw>
+              </a:effectLst>
+              <a:latin typeface="Blackadder ITC" panose="04020505051007020D02" pitchFamily="82" charset="0"/>
+              <a:ea typeface="MS PGothic" panose="020B0600070205080204" charset="-128"/>
+            </a:endParaRPr>
           </a:p>
         </p:txBody>
       </p:sp>
     </p:spTree>
-    <p:extLst>
-      <p:ext uri="{BB962C8B-B14F-4D97-AF65-F5344CB8AC3E}">
-        <p14:creationId xmlns:p14="http://schemas.microsoft.com/office/powerpoint/2010/main" val="3834205765"/>
-      </p:ext>
-    </p:extLst>
   </p:cSld>
   <p:clrMapOvr>
     <a:masterClrMapping/>
@@ -8363,6 +8259,7 @@
               <a:rPr lang="en-US" dirty="0" smtClean="0"/>
               <a:t>“Chapter 11”</a:t>
             </a:r>
+            <a:endParaRPr lang="en-US" dirty="0" smtClean="0"/>
           </a:p>
           <a:p>
             <a:endParaRPr lang="en-US" dirty="0"/>
@@ -8370,11 +8267,6 @@
         </p:txBody>
       </p:sp>
     </p:spTree>
-    <p:extLst>
-      <p:ext uri="{BB962C8B-B14F-4D97-AF65-F5344CB8AC3E}">
-        <p14:creationId xmlns:p14="http://schemas.microsoft.com/office/powerpoint/2010/main" val="497241466"/>
-      </p:ext>
-    </p:extLst>
   </p:cSld>
   <p:clrMapOvr>
     <a:masterClrMapping/>
@@ -8430,12 +8322,25 @@
                     <a:srgbClr val="DDDDDD"/>
                   </a:outerShdw>
                 </a:effectLst>
-                <a:latin typeface="Trebuchet MS" charset="0"/>
-                <a:ea typeface="ＭＳ Ｐゴシック" charset="0"/>
-                <a:cs typeface="Trebuchet MS" charset="0"/>
+                <a:latin typeface="Trebuchet MS" panose="020B0603020202020204" charset="0"/>
+                <a:ea typeface="MS PGothic" panose="020B0600070205080204" charset="-128"/>
+                <a:cs typeface="Trebuchet MS" panose="020B0603020202020204" charset="0"/>
               </a:rPr>
               <a:t>Outline</a:t>
             </a:r>
+            <a:endParaRPr lang="en-US" altLang="ko-KR" sz="4800">
+              <a:ln>
+                <a:noFill/>
+              </a:ln>
+              <a:effectLst>
+                <a:outerShdw blurRad="38100" dist="38100" dir="2700000" algn="tl">
+                  <a:srgbClr val="DDDDDD"/>
+                </a:outerShdw>
+              </a:effectLst>
+              <a:latin typeface="Trebuchet MS" panose="020B0603020202020204" charset="0"/>
+              <a:ea typeface="MS PGothic" panose="020B0600070205080204" charset="-128"/>
+              <a:cs typeface="Trebuchet MS" panose="020B0603020202020204" charset="0"/>
+            </a:endParaRPr>
           </a:p>
         </p:txBody>
       </p:sp>
@@ -8443,13 +8348,7 @@
         <p:nvGraphicFramePr>
           <p:cNvPr id="3" name="Diagram 2"/>
           <p:cNvGraphicFramePr/>
-          <p:nvPr>
-            <p:extLst>
-              <p:ext uri="{D42A27DB-BD31-4B8C-83A1-F6EECF244321}">
-                <p14:modId xmlns:p14="http://schemas.microsoft.com/office/powerpoint/2010/main" val="2165622323"/>
-              </p:ext>
-            </p:extLst>
-          </p:nvPr>
+          <p:nvPr/>
         </p:nvGraphicFramePr>
         <p:xfrm>
           <a:off x="900113" y="1682750"/>
@@ -8457,16 +8356,11 @@
         </p:xfrm>
         <a:graphic>
           <a:graphicData uri="http://schemas.openxmlformats.org/drawingml/2006/diagram">
-            <dgm:relIds xmlns:dgm="http://schemas.openxmlformats.org/drawingml/2006/diagram" xmlns:r="http://schemas.openxmlformats.org/officeDocument/2006/relationships" r:dm="rId2" r:lo="rId3" r:qs="rId4" r:cs="rId5"/>
+            <dgm:relIds xmlns:dgm="http://schemas.openxmlformats.org/drawingml/2006/diagram" xmlns:r="http://schemas.openxmlformats.org/officeDocument/2006/relationships" r:dm="rId1" r:lo="rId2" r:qs="rId3" r:cs="rId4"/>
           </a:graphicData>
         </a:graphic>
       </p:graphicFrame>
     </p:spTree>
-    <p:extLst>
-      <p:ext uri="{BB962C8B-B14F-4D97-AF65-F5344CB8AC3E}">
-        <p14:creationId xmlns:p14="http://schemas.microsoft.com/office/powerpoint/2010/main" val="3885935720"/>
-      </p:ext>
-    </p:extLst>
   </p:cSld>
   <p:clrMapOvr>
     <a:masterClrMapping/>
@@ -8554,6 +8448,7 @@
               <a:rPr lang="en-US" dirty="0" smtClean="0"/>
               <a:t>layer:</a:t>
             </a:r>
+            <a:endParaRPr lang="en-US" dirty="0" smtClean="0"/>
           </a:p>
           <a:p>
             <a:pPr marL="514350" indent="-514350">
@@ -8620,6 +8515,7 @@
               <a:rPr lang="en-US" sz="2400" dirty="0" smtClean="0"/>
               <a:t>.</a:t>
             </a:r>
+            <a:endParaRPr lang="en-US" sz="2400" dirty="0" smtClean="0"/>
           </a:p>
           <a:p>
             <a:pPr marL="857250" lvl="1" indent="-457200"/>
@@ -8627,6 +8523,7 @@
               <a:rPr lang="en-US" sz="2400" dirty="0" smtClean="0"/>
               <a:t>Framing (organize bits that carried out by the PHY Layer)</a:t>
             </a:r>
+            <a:endParaRPr lang="en-US" sz="2400" dirty="0" smtClean="0"/>
           </a:p>
           <a:p>
             <a:pPr marL="857250" lvl="1" indent="-457200"/>
@@ -8634,6 +8531,7 @@
               <a:rPr lang="en-US" sz="2400" dirty="0" smtClean="0"/>
               <a:t>Flow and Error Control</a:t>
             </a:r>
+            <a:endParaRPr lang="en-US" sz="2400" dirty="0" smtClean="0"/>
           </a:p>
           <a:p>
             <a:pPr marL="857250" lvl="1" indent="-457200"/>
@@ -8676,6 +8574,11 @@
               </a:rPr>
               <a:t>control </a:t>
             </a:r>
+            <a:endParaRPr lang="en-US" dirty="0" smtClean="0">
+              <a:solidFill>
+                <a:srgbClr val="FF0000"/>
+              </a:solidFill>
+            </a:endParaRPr>
           </a:p>
           <a:p>
             <a:pPr lvl="1"/>
@@ -8719,15 +8622,15 @@
               </a:rPr>
               <a:t>to share the link</a:t>
             </a:r>
+            <a:endParaRPr lang="en-US" sz="2400" dirty="0">
+              <a:solidFill>
+                <a:srgbClr val="3366FF"/>
+              </a:solidFill>
+            </a:endParaRPr>
           </a:p>
         </p:txBody>
       </p:sp>
     </p:spTree>
-    <p:extLst>
-      <p:ext uri="{BB962C8B-B14F-4D97-AF65-F5344CB8AC3E}">
-        <p14:creationId xmlns:p14="http://schemas.microsoft.com/office/powerpoint/2010/main" val="1398944595"/>
-      </p:ext>
-    </p:extLst>
   </p:cSld>
   <p:clrMapOvr>
     <a:masterClrMapping/>
@@ -8829,6 +8732,7 @@
               <a:rPr lang="en-US" dirty="0"/>
               <a:t> from the source to the destination. </a:t>
             </a:r>
+            <a:endParaRPr lang="en-US" dirty="0"/>
           </a:p>
           <a:p>
             <a:pPr lvl="1"/>
@@ -8894,49 +8798,6 @@
                 </a:solidFill>
               </a:rPr>
               <a:t>layer</a:t>
-            </a:r>
-          </a:p>
-          <a:p>
-            <a:pPr lvl="1"/>
-            <a:r>
-              <a:rPr lang="en-US" dirty="0" smtClean="0">
-                <a:solidFill>
-                  <a:srgbClr val="3366FF"/>
-                </a:solidFill>
-              </a:rPr>
-              <a:t>Needs </a:t>
-            </a:r>
-            <a:r>
-              <a:rPr lang="en-US" dirty="0">
-                <a:solidFill>
-                  <a:srgbClr val="3366FF"/>
-                </a:solidFill>
-              </a:rPr>
-              <a:t>to pack bits into frames</a:t>
-            </a:r>
-            <a:r>
-              <a:rPr lang="en-US" dirty="0"/>
-              <a:t>, so that each frame is distinguishable from another. </a:t>
-            </a:r>
-            <a:r>
-              <a:rPr lang="en-US" dirty="0" smtClean="0">
-                <a:solidFill>
-                  <a:srgbClr val="3366FF"/>
-                </a:solidFill>
-              </a:rPr>
-              <a:t>Example</a:t>
-            </a:r>
-            <a:r>
-              <a:rPr lang="en-US" dirty="0" smtClean="0"/>
-              <a:t>: Our </a:t>
-            </a:r>
-            <a:r>
-              <a:rPr lang="en-US" dirty="0">
-                <a:solidFill>
-                  <a:srgbClr val="FF0000"/>
-                </a:solidFill>
-              </a:rPr>
-              <a:t>postal system </a:t>
             </a:r>
             <a:endParaRPr lang="en-US" dirty="0" smtClean="0">
               <a:solidFill>
@@ -8944,14 +8805,57 @@
               </a:solidFill>
             </a:endParaRPr>
           </a:p>
+          <a:p>
+            <a:pPr lvl="1"/>
+            <a:r>
+              <a:rPr lang="en-US" dirty="0" smtClean="0">
+                <a:solidFill>
+                  <a:srgbClr val="3366FF"/>
+                </a:solidFill>
+              </a:rPr>
+              <a:t>Needs </a:t>
+            </a:r>
+            <a:r>
+              <a:rPr lang="en-US" dirty="0">
+                <a:solidFill>
+                  <a:srgbClr val="3366FF"/>
+                </a:solidFill>
+              </a:rPr>
+              <a:t>to pack bits into frames</a:t>
+            </a:r>
+            <a:r>
+              <a:rPr lang="en-US" dirty="0"/>
+              <a:t>, so that each frame is distinguishable from another. </a:t>
+            </a:r>
+            <a:r>
+              <a:rPr lang="en-US" dirty="0" smtClean="0">
+                <a:solidFill>
+                  <a:srgbClr val="3366FF"/>
+                </a:solidFill>
+              </a:rPr>
+              <a:t>Example</a:t>
+            </a:r>
+            <a:r>
+              <a:rPr lang="en-US" dirty="0" smtClean="0"/>
+              <a:t>: Our </a:t>
+            </a:r>
+            <a:r>
+              <a:rPr lang="en-US" dirty="0">
+                <a:solidFill>
+                  <a:srgbClr val="FF0000"/>
+                </a:solidFill>
+              </a:rPr>
+              <a:t>postal system </a:t>
+            </a:r>
+            <a:endParaRPr lang="en-US" dirty="0" smtClean="0">
+              <a:solidFill>
+                <a:srgbClr val="FF0000"/>
+              </a:solidFill>
+            </a:endParaRPr>
+          </a:p>
         </p:txBody>
       </p:sp>
     </p:spTree>
-    <p:extLst>
-      <p:ext uri="{BB962C8B-B14F-4D97-AF65-F5344CB8AC3E}">
-        <p14:creationId xmlns:p14="http://schemas.microsoft.com/office/powerpoint/2010/main" val="2343361103"/>
-      </p:ext>
-    </p:extLst>
   </p:cSld>
   <p:clrMapOvr>
     <a:masterClrMapping/>
@@ -9029,6 +8933,7 @@
               <a:rPr lang="en-US" dirty="0"/>
               <a:t> separates a message from one source to a destination, or from other messages to other destinations, </a:t>
             </a:r>
+            <a:endParaRPr lang="en-US" dirty="0"/>
           </a:p>
           <a:p>
             <a:pPr marL="914400" lvl="2" indent="0">
@@ -9066,6 +8971,7 @@
               <a:rPr lang="en-US" dirty="0"/>
               <a:t>.</a:t>
             </a:r>
+            <a:endParaRPr lang="en-US" dirty="0"/>
           </a:p>
           <a:p>
             <a:pPr marL="914400" lvl="2" indent="0">
@@ -9099,6 +9005,7 @@
               <a:rPr lang="en-US" dirty="0"/>
               <a:t>go; </a:t>
             </a:r>
+            <a:endParaRPr lang="en-US" dirty="0"/>
           </a:p>
           <a:p>
             <a:pPr marL="914400" lvl="2" indent="0">
@@ -9147,6 +9054,7 @@
               <a:rPr lang="en-US" dirty="0" smtClean="0"/>
               <a:t>In a large frame Flow and Error very inefficient. </a:t>
             </a:r>
+            <a:endParaRPr lang="en-US" dirty="0" smtClean="0"/>
           </a:p>
           <a:p>
             <a:r>
@@ -9157,6 +9065,11 @@
               </a:rPr>
               <a:t>Fixed-Size Framing</a:t>
             </a:r>
+            <a:endParaRPr lang="en-US" dirty="0" smtClean="0">
+              <a:solidFill>
+                <a:srgbClr val="FF0000"/>
+              </a:solidFill>
+            </a:endParaRPr>
           </a:p>
           <a:p>
             <a:pPr lvl="1"/>
@@ -9172,6 +9085,7 @@
               <a:rPr lang="en-US" dirty="0" smtClean="0"/>
               <a:t>frames.</a:t>
             </a:r>
+            <a:endParaRPr lang="en-US" dirty="0" smtClean="0"/>
           </a:p>
           <a:p>
             <a:pPr lvl="1"/>
@@ -9203,6 +9117,7 @@
               <a:rPr lang="en-US" dirty="0" smtClean="0"/>
               <a:t>network.</a:t>
             </a:r>
+            <a:endParaRPr lang="en-US" dirty="0" smtClean="0"/>
           </a:p>
           <a:p>
             <a:r>
@@ -9213,6 +9128,11 @@
               </a:rPr>
               <a:t>Variable-Size Framing</a:t>
             </a:r>
+            <a:endParaRPr lang="en-US" dirty="0" smtClean="0">
+              <a:solidFill>
+                <a:srgbClr val="FF0000"/>
+              </a:solidFill>
+            </a:endParaRPr>
           </a:p>
           <a:p>
             <a:pPr lvl="1"/>
@@ -9312,6 +9232,7 @@
               <a:rPr lang="en-US" dirty="0" smtClean="0"/>
               <a:t>)</a:t>
             </a:r>
+            <a:endParaRPr lang="en-US" dirty="0" smtClean="0"/>
           </a:p>
           <a:p>
             <a:pPr lvl="2"/>
@@ -9339,15 +9260,11 @@
               <a:rPr lang="en-US" dirty="0" smtClean="0"/>
               <a:t>)</a:t>
             </a:r>
+            <a:endParaRPr lang="en-US" dirty="0" smtClean="0"/>
           </a:p>
         </p:txBody>
       </p:sp>
     </p:spTree>
-    <p:extLst>
-      <p:ext uri="{BB962C8B-B14F-4D97-AF65-F5344CB8AC3E}">
-        <p14:creationId xmlns:p14="http://schemas.microsoft.com/office/powerpoint/2010/main" val="3840086342"/>
-      </p:ext>
-    </p:extLst>
   </p:cSld>
   <p:clrMapOvr>
     <a:masterClrMapping/>
@@ -9393,10 +9310,6 @@
               <a:rPr lang="en-US" dirty="0" smtClean="0"/>
               <a:t>Character Stuffing</a:t>
             </a:r>
-            <a:r>
-              <a:rPr lang="en-US" dirty="0"/>
-              <a:t/>
-            </a:r>
             <a:br>
               <a:rPr lang="en-US" dirty="0"/>
             </a:br>
@@ -9454,6 +9367,7 @@
               <a:rPr lang="en-US" dirty="0" smtClean="0"/>
               <a:t>ASCII. </a:t>
             </a:r>
+            <a:endParaRPr lang="en-US" dirty="0" smtClean="0"/>
           </a:p>
           <a:p>
             <a:r>
@@ -9480,6 +9394,7 @@
               <a:rPr lang="en-US" dirty="0" smtClean="0"/>
               <a:t>information </a:t>
             </a:r>
+            <a:endParaRPr lang="en-US" dirty="0" smtClean="0"/>
           </a:p>
           <a:p>
             <a:r>
@@ -9490,6 +9405,11 @@
               </a:rPr>
               <a:t>The trailer</a:t>
             </a:r>
+            <a:endParaRPr lang="en-US" dirty="0" smtClean="0">
+              <a:solidFill>
+                <a:srgbClr val="FF0000"/>
+              </a:solidFill>
+            </a:endParaRPr>
           </a:p>
           <a:p>
             <a:pPr lvl="1"/>
@@ -9505,6 +9425,7 @@
               <a:rPr lang="en-US" dirty="0" smtClean="0"/>
               <a:t>bits </a:t>
             </a:r>
+            <a:endParaRPr lang="en-US" dirty="0" smtClean="0"/>
           </a:p>
           <a:p>
             <a:r>
@@ -9515,6 +9436,11 @@
               </a:rPr>
               <a:t>Flag </a:t>
             </a:r>
+            <a:endParaRPr lang="en-US" dirty="0" smtClean="0">
+              <a:solidFill>
+                <a:srgbClr val="FF0000"/>
+              </a:solidFill>
+            </a:endParaRPr>
           </a:p>
           <a:p>
             <a:pPr lvl="1"/>
@@ -9620,6 +9546,11 @@
               </a:rPr>
               <a:t>frame</a:t>
             </a:r>
+            <a:endParaRPr lang="en-US" dirty="0" smtClean="0">
+              <a:solidFill>
+                <a:srgbClr val="E46C0A"/>
+              </a:solidFill>
+            </a:endParaRPr>
           </a:p>
           <a:p>
             <a:pPr lvl="1"/>
@@ -9635,15 +9566,11 @@
               <a:rPr lang="en-US" dirty="0"/>
               <a:t>the start or end of a frame. </a:t>
             </a:r>
+            <a:endParaRPr lang="en-US" dirty="0"/>
           </a:p>
         </p:txBody>
       </p:sp>
     </p:spTree>
-    <p:extLst>
-      <p:ext uri="{BB962C8B-B14F-4D97-AF65-F5344CB8AC3E}">
-        <p14:creationId xmlns:p14="http://schemas.microsoft.com/office/powerpoint/2010/main" val="2697228024"/>
-      </p:ext>
-    </p:extLst>
   </p:cSld>
   <p:clrMapOvr>
     <a:masterClrMapping/>
@@ -9715,7 +9642,7 @@
           <p:nvPr/>
         </p:nvPicPr>
         <p:blipFill>
-          <a:blip r:embed="rId2"/>
+          <a:blip r:embed="rId1"/>
           <a:stretch>
             <a:fillRect/>
           </a:stretch>
@@ -9731,11 +9658,6 @@
         </p:spPr>
       </p:pic>
     </p:spTree>
-    <p:extLst>
-      <p:ext uri="{BB962C8B-B14F-4D97-AF65-F5344CB8AC3E}">
-        <p14:creationId xmlns:p14="http://schemas.microsoft.com/office/powerpoint/2010/main" val="1462429942"/>
-      </p:ext>
-    </p:extLst>
   </p:cSld>
   <p:clrMapOvr>
     <a:masterClrMapping/>
@@ -9824,6 +9746,7 @@
               <a:rPr lang="en-US" sz="3000" dirty="0" smtClean="0"/>
               <a:t>information </a:t>
             </a:r>
+            <a:endParaRPr lang="en-US" sz="3000" dirty="0" smtClean="0"/>
           </a:p>
           <a:p>
             <a:pPr lvl="1"/>
@@ -9962,6 +9885,7 @@
               <a:rPr lang="en-US" dirty="0" smtClean="0"/>
               <a:t>added</a:t>
             </a:r>
+            <a:endParaRPr lang="en-US" dirty="0" smtClean="0"/>
           </a:p>
           <a:p>
             <a:pPr lvl="1"/>
@@ -9999,6 +9923,11 @@
               </a:rPr>
               <a:t>same pattern as the flag</a:t>
             </a:r>
+            <a:endParaRPr lang="en-US" dirty="0" smtClean="0">
+              <a:solidFill>
+                <a:srgbClr val="984807"/>
+              </a:solidFill>
+            </a:endParaRPr>
           </a:p>
           <a:p>
             <a:pPr lvl="1"/>
@@ -10057,11 +9986,6 @@
         </p:txBody>
       </p:sp>
     </p:spTree>
-    <p:extLst>
-      <p:ext uri="{BB962C8B-B14F-4D97-AF65-F5344CB8AC3E}">
-        <p14:creationId xmlns:p14="http://schemas.microsoft.com/office/powerpoint/2010/main" val="1304259740"/>
-      </p:ext>
-    </p:extLst>
   </p:cSld>
   <p:clrMapOvr>
     <a:masterClrMapping/>
@@ -10349,8 +10273,11 @@
       </a:bgFillStyleLst>
     </a:fmtScheme>
   </a:themeElements>
-  <a:objectDefaults/>
-  <a:extraClrSchemeLst/>
+  <a:extLst>
+    <a:ext uri="{05A4C25C-085E-4340-85A3-A5531E510DB2}">
+      <thm15:themeFamily xmlns:thm15="http://schemas.microsoft.com/office/thememl/2012/main" name="Office Theme" id="{62F939B6-93AF-4DB8-9C6B-D6C7DFDC589F}" vid="{4A3C46E8-61CC-4603-A589-7422A47A8E4A}"/>
+    </a:ext>
+  </a:extLst>
 </a:theme>
 </file>
 
@@ -10634,7 +10561,10 @@
       </a:bgFillStyleLst>
     </a:fmtScheme>
   </a:themeElements>
-  <a:objectDefaults/>
-  <a:extraClrSchemeLst/>
+  <a:extLst>
+    <a:ext uri="{05A4C25C-085E-4340-85A3-A5531E510DB2}">
+      <thm15:themeFamily xmlns:thm15="http://schemas.microsoft.com/office/thememl/2012/main" name="Office Theme" id="{62F939B6-93AF-4DB8-9C6B-D6C7DFDC589F}" vid="{4A3C46E8-61CC-4603-A589-7422A47A8E4A}"/>
+    </a:ext>
+  </a:extLst>
 </a:theme>
 </file>
</xml_diff>